<commit_message>
Update Report, PPT dan menambahkan Paper Rujukan
</commit_message>
<xml_diff>
--- a/Report/FPv1.pptx
+++ b/Report/FPv1.pptx
@@ -5,27 +5,27 @@
     <p:sldMasterId id="2147483648" r:id="rId1"/>
   </p:sldMasterIdLst>
   <p:notesMasterIdLst>
-    <p:notesMasterId r:id="rId20"/>
+    <p:notesMasterId r:id="rId9"/>
   </p:notesMasterIdLst>
   <p:sldIdLst>
-    <p:sldId id="256" r:id="rId2"/>
-    <p:sldId id="257" r:id="rId3"/>
-    <p:sldId id="258" r:id="rId4"/>
-    <p:sldId id="259" r:id="rId5"/>
-    <p:sldId id="260" r:id="rId6"/>
-    <p:sldId id="261" r:id="rId7"/>
-    <p:sldId id="262" r:id="rId8"/>
-    <p:sldId id="263" r:id="rId9"/>
-    <p:sldId id="264" r:id="rId10"/>
-    <p:sldId id="265" r:id="rId11"/>
-    <p:sldId id="266" r:id="rId12"/>
-    <p:sldId id="267" r:id="rId13"/>
-    <p:sldId id="268" r:id="rId14"/>
-    <p:sldId id="270" r:id="rId15"/>
-    <p:sldId id="271" r:id="rId16"/>
-    <p:sldId id="272" r:id="rId17"/>
-    <p:sldId id="276" r:id="rId18"/>
-    <p:sldId id="279" r:id="rId19"/>
+    <p:sldId id="256" r:id="rId3"/>
+    <p:sldId id="257" r:id="rId4"/>
+    <p:sldId id="258" r:id="rId5"/>
+    <p:sldId id="259" r:id="rId6"/>
+    <p:sldId id="260" r:id="rId7"/>
+    <p:sldId id="261" r:id="rId8"/>
+    <p:sldId id="262" r:id="rId10"/>
+    <p:sldId id="263" r:id="rId11"/>
+    <p:sldId id="264" r:id="rId12"/>
+    <p:sldId id="265" r:id="rId13"/>
+    <p:sldId id="266" r:id="rId14"/>
+    <p:sldId id="267" r:id="rId15"/>
+    <p:sldId id="268" r:id="rId16"/>
+    <p:sldId id="270" r:id="rId17"/>
+    <p:sldId id="271" r:id="rId18"/>
+    <p:sldId id="272" r:id="rId19"/>
+    <p:sldId id="276" r:id="rId20"/>
+    <p:sldId id="279" r:id="rId21"/>
   </p:sldIdLst>
   <p:sldSz cx="12192000" cy="6858000"/>
   <p:notesSz cx="6858000" cy="9144000"/>
@@ -124,18 +124,13 @@
       </a:defRPr>
     </a:lvl9pPr>
   </p:defaultTextStyle>
-  <p:extLst>
-    <p:ext uri="{EFAFB233-063F-42B5-8137-9DF3F51BA10A}">
-      <p15:sldGuideLst xmlns:p15="http://schemas.microsoft.com/office/powerpoint/2012/main"/>
-    </p:ext>
-  </p:extLst>
 </p:presentation>
 </file>
 
 <file path=ppt/charts/chart1.xml><?xml version="1.0" encoding="utf-8"?>
-<c:chartSpace xmlns:c="http://schemas.openxmlformats.org/drawingml/2006/chart" xmlns:a="http://schemas.openxmlformats.org/drawingml/2006/main" xmlns:r="http://schemas.openxmlformats.org/officeDocument/2006/relationships" xmlns:c16r2="http://schemas.microsoft.com/office/drawing/2015/06/chart">
+<c:chartSpace xmlns:c="http://schemas.openxmlformats.org/drawingml/2006/chart" xmlns:a="http://schemas.openxmlformats.org/drawingml/2006/main" xmlns:r="http://schemas.openxmlformats.org/officeDocument/2006/relationships">
   <c:date1904 val="0"/>
-  <c:lang val="en-US"/>
+  <c:lang val="zh-CN"/>
   <c:roundedCorners val="0"/>
   <mc:AlternateContent xmlns:mc="http://schemas.openxmlformats.org/markup-compatibility/2006">
     <mc:Choice xmlns:c14="http://schemas.microsoft.com/office/drawing/2007/8/2/chart" Requires="c14">
@@ -181,6 +176,7 @@
           </a:p>
         </c:rich>
       </c:tx>
+      <c:layout/>
       <c:overlay val="0"/>
       <c:spPr>
         <a:noFill/>
@@ -189,26 +185,6 @@
         </a:ln>
         <a:effectLst/>
       </c:spPr>
-      <c:txPr>
-        <a:bodyPr rot="0" spcFirstLastPara="1" vertOverflow="ellipsis" vert="horz" wrap="square" anchor="ctr" anchorCtr="1"/>
-        <a:lstStyle/>
-        <a:p>
-          <a:pPr>
-            <a:defRPr lang="en-US" sz="1860" b="0" i="0" u="none" strike="noStrike" kern="1200" spc="0" baseline="0">
-              <a:solidFill>
-                <a:schemeClr val="tx1">
-                  <a:lumMod val="65000"/>
-                  <a:lumOff val="35000"/>
-                </a:schemeClr>
-              </a:solidFill>
-              <a:latin typeface="+mn-lt"/>
-              <a:ea typeface="+mn-ea"/>
-              <a:cs typeface="+mn-cs"/>
-            </a:defRPr>
-          </a:pPr>
-          <a:endParaRPr lang="en-US"/>
-        </a:p>
-      </c:txPr>
     </c:title>
     <c:autoTitleDeleted val="0"/>
     <c:plotArea>
@@ -229,6 +205,8 @@
               </c:strCache>
             </c:strRef>
           </c:tx>
+          <c:spPr/>
+          <c:explosion val="0"/>
           <c:dPt>
             <c:idx val="0"/>
             <c:bubble3D val="0"/>
@@ -243,11 +221,6 @@
               </a:ln>
               <a:effectLst/>
             </c:spPr>
-            <c:extLst>
-              <c:ext xmlns:c16="http://schemas.microsoft.com/office/drawing/2014/chart" uri="{C3380CC4-5D6E-409C-BE32-E72D297353CC}">
-                <c16:uniqueId val="{00000001-D152-42C3-82BF-56A997DC7AE3}"/>
-              </c:ext>
-            </c:extLst>
           </c:dPt>
           <c:dPt>
             <c:idx val="1"/>
@@ -263,11 +236,6 @@
               </a:ln>
               <a:effectLst/>
             </c:spPr>
-            <c:extLst>
-              <c:ext xmlns:c16="http://schemas.microsoft.com/office/drawing/2014/chart" uri="{C3380CC4-5D6E-409C-BE32-E72D297353CC}">
-                <c16:uniqueId val="{00000003-D152-42C3-82BF-56A997DC7AE3}"/>
-              </c:ext>
-            </c:extLst>
           </c:dPt>
           <c:dPt>
             <c:idx val="2"/>
@@ -283,11 +251,6 @@
               </a:ln>
               <a:effectLst/>
             </c:spPr>
-            <c:extLst>
-              <c:ext xmlns:c16="http://schemas.microsoft.com/office/drawing/2014/chart" uri="{C3380CC4-5D6E-409C-BE32-E72D297353CC}">
-                <c16:uniqueId val="{00000005-D152-42C3-82BF-56A997DC7AE3}"/>
-              </c:ext>
-            </c:extLst>
           </c:dPt>
           <c:dPt>
             <c:idx val="3"/>
@@ -303,11 +266,6 @@
               </a:ln>
               <a:effectLst/>
             </c:spPr>
-            <c:extLst>
-              <c:ext xmlns:c16="http://schemas.microsoft.com/office/drawing/2014/chart" uri="{C3380CC4-5D6E-409C-BE32-E72D297353CC}">
-                <c16:uniqueId val="{00000007-D152-42C3-82BF-56A997DC7AE3}"/>
-              </c:ext>
-            </c:extLst>
           </c:dPt>
           <c:dPt>
             <c:idx val="4"/>
@@ -323,12 +281,10 @@
               </a:ln>
               <a:effectLst/>
             </c:spPr>
-            <c:extLst>
-              <c:ext xmlns:c16="http://schemas.microsoft.com/office/drawing/2014/chart" uri="{C3380CC4-5D6E-409C-BE32-E72D297353CC}">
-                <c16:uniqueId val="{00000009-D152-42C3-82BF-56A997DC7AE3}"/>
-              </c:ext>
-            </c:extLst>
           </c:dPt>
+          <c:dLbls>
+            <c:delete val="1"/>
+          </c:dLbls>
           <c:cat>
             <c:strRef>
               <c:f>Sheet1!$A$2:$A$6</c:f>
@@ -376,11 +332,6 @@
               </c:numCache>
             </c:numRef>
           </c:val>
-          <c:extLst>
-            <c:ext xmlns:c16="http://schemas.microsoft.com/office/drawing/2014/chart" uri="{C3380CC4-5D6E-409C-BE32-E72D297353CC}">
-              <c16:uniqueId val="{0000000A-D152-42C3-82BF-56A997DC7AE3}"/>
-            </c:ext>
-          </c:extLst>
         </c:ser>
         <c:dLbls>
           <c:showLegendKey val="0"/>
@@ -403,6 +354,7 @@
     </c:plotArea>
     <c:legend>
       <c:legendPos val="b"/>
+      <c:layout/>
       <c:overlay val="0"/>
       <c:spPr>
         <a:noFill/>
@@ -428,7 +380,6 @@
               <a:cs typeface="+mn-cs"/>
             </a:defRPr>
           </a:pPr>
-          <a:endParaRPr lang="en-US"/>
         </a:p>
       </c:txPr>
     </c:legend>
@@ -450,10 +401,9 @@
       <a:pPr>
         <a:defRPr lang="en-US"/>
       </a:pPr>
-      <a:endParaRPr lang="en-US"/>
     </a:p>
   </c:txPr>
-  <c:externalData r:id="rId3">
+  <c:externalData r:id="rId1">
     <c:autoUpdate val="0"/>
   </c:externalData>
 </c:chartSpace>
@@ -1100,7 +1050,6 @@
           <a:p>
             <a:fld id="{3EFD42F7-718C-4B98-AAEC-167E6DDD60A7}" type="datetimeFigureOut">
               <a:rPr lang="en-US" smtClean="0"/>
-              <a:t>6/10/2023</a:t>
             </a:fld>
             <a:endParaRPr lang="en-US"/>
           </a:p>
@@ -1167,6 +1116,7 @@
               <a:rPr lang="en-US"/>
               <a:t>Click to edit Master text styles</a:t>
             </a:r>
+            <a:endParaRPr lang="en-US"/>
           </a:p>
           <a:p>
             <a:pPr lvl="1"/>
@@ -1174,6 +1124,7 @@
               <a:rPr lang="en-US"/>
               <a:t>Second level</a:t>
             </a:r>
+            <a:endParaRPr lang="en-US"/>
           </a:p>
           <a:p>
             <a:pPr lvl="2"/>
@@ -1181,6 +1132,7 @@
               <a:rPr lang="en-US"/>
               <a:t>Third level</a:t>
             </a:r>
+            <a:endParaRPr lang="en-US"/>
           </a:p>
           <a:p>
             <a:pPr lvl="3"/>
@@ -1188,6 +1140,7 @@
               <a:rPr lang="en-US"/>
               <a:t>Fourth level</a:t>
             </a:r>
+            <a:endParaRPr lang="en-US"/>
           </a:p>
           <a:p>
             <a:pPr lvl="4"/>
@@ -1195,6 +1148,7 @@
               <a:rPr lang="en-US"/>
               <a:t>Fifth level</a:t>
             </a:r>
+            <a:endParaRPr lang="en-US"/>
           </a:p>
         </p:txBody>
       </p:sp>
@@ -1258,7 +1212,6 @@
           <a:p>
             <a:fld id="{21B2AA4F-B828-4D7C-AFD3-893933DAFCB4}" type="slidenum">
               <a:rPr lang="en-US" smtClean="0"/>
-              <a:t>‹#›</a:t>
             </a:fld>
             <a:endParaRPr lang="en-US"/>
           </a:p>
@@ -1463,6 +1416,7 @@
               <a:rPr lang="en-US"/>
               <a:t>Click to edit Master title style</a:t>
             </a:r>
+            <a:endParaRPr lang="en-US"/>
           </a:p>
         </p:txBody>
       </p:sp>
@@ -1527,6 +1481,7 @@
               <a:rPr lang="en-US"/>
               <a:t>Click to edit Master subtitle style</a:t>
             </a:r>
+            <a:endParaRPr lang="en-US"/>
           </a:p>
         </p:txBody>
       </p:sp>
@@ -1547,7 +1502,6 @@
           <a:p>
             <a:fld id="{47C8330A-A046-467A-9D75-3F2CDB9E8E27}" type="datetimeFigureOut">
               <a:rPr lang="en-US" smtClean="0"/>
-              <a:t>6/10/2023</a:t>
             </a:fld>
             <a:endParaRPr lang="en-US"/>
           </a:p>
@@ -1589,7 +1543,6 @@
           <a:p>
             <a:fld id="{E14535C2-0B7C-4279-BD60-7740349214BA}" type="slidenum">
               <a:rPr lang="en-US" smtClean="0"/>
-              <a:t>‹#›</a:t>
             </a:fld>
             <a:endParaRPr lang="en-US"/>
           </a:p>
@@ -1600,13 +1553,13 @@
   <p:clrMapOvr>
     <a:masterClrMapping/>
   </p:clrMapOvr>
-  <mc:AlternateContent xmlns:mc="http://schemas.openxmlformats.org/markup-compatibility/2006" xmlns:p14="http://schemas.microsoft.com/office/powerpoint/2010/main">
-    <mc:Choice Requires="p14">
+  <mc:AlternateContent xmlns:mc="http://schemas.openxmlformats.org/markup-compatibility/2006">
+    <mc:Choice xmlns:p14="http://schemas.microsoft.com/office/powerpoint/2010/main" Requires="p14">
       <p:transition spd="med" p14:dur="700">
         <p:fade/>
       </p:transition>
     </mc:Choice>
-    <mc:Fallback xmlns="">
+    <mc:Fallback>
       <p:transition spd="med">
         <p:fade/>
       </p:transition>
@@ -1651,6 +1604,7 @@
               <a:rPr lang="en-US"/>
               <a:t>Click to edit Master title style</a:t>
             </a:r>
+            <a:endParaRPr lang="en-US"/>
           </a:p>
         </p:txBody>
       </p:sp>
@@ -1674,6 +1628,7 @@
               <a:rPr lang="en-US"/>
               <a:t>Click to edit Master text styles</a:t>
             </a:r>
+            <a:endParaRPr lang="en-US"/>
           </a:p>
           <a:p>
             <a:pPr lvl="1"/>
@@ -1681,6 +1636,7 @@
               <a:rPr lang="en-US"/>
               <a:t>Second level</a:t>
             </a:r>
+            <a:endParaRPr lang="en-US"/>
           </a:p>
           <a:p>
             <a:pPr lvl="2"/>
@@ -1688,6 +1644,7 @@
               <a:rPr lang="en-US"/>
               <a:t>Third level</a:t>
             </a:r>
+            <a:endParaRPr lang="en-US"/>
           </a:p>
           <a:p>
             <a:pPr lvl="3"/>
@@ -1695,6 +1652,7 @@
               <a:rPr lang="en-US"/>
               <a:t>Fourth level</a:t>
             </a:r>
+            <a:endParaRPr lang="en-US"/>
           </a:p>
           <a:p>
             <a:pPr lvl="4"/>
@@ -1702,6 +1660,7 @@
               <a:rPr lang="en-US"/>
               <a:t>Fifth level</a:t>
             </a:r>
+            <a:endParaRPr lang="en-US"/>
           </a:p>
         </p:txBody>
       </p:sp>
@@ -1722,7 +1681,6 @@
           <a:p>
             <a:fld id="{47C8330A-A046-467A-9D75-3F2CDB9E8E27}" type="datetimeFigureOut">
               <a:rPr lang="en-US" smtClean="0"/>
-              <a:t>6/10/2023</a:t>
             </a:fld>
             <a:endParaRPr lang="en-US"/>
           </a:p>
@@ -1764,7 +1722,6 @@
           <a:p>
             <a:fld id="{E14535C2-0B7C-4279-BD60-7740349214BA}" type="slidenum">
               <a:rPr lang="en-US" smtClean="0"/>
-              <a:t>‹#›</a:t>
             </a:fld>
             <a:endParaRPr lang="en-US"/>
           </a:p>
@@ -1775,13 +1732,13 @@
   <p:clrMapOvr>
     <a:masterClrMapping/>
   </p:clrMapOvr>
-  <mc:AlternateContent xmlns:mc="http://schemas.openxmlformats.org/markup-compatibility/2006" xmlns:p14="http://schemas.microsoft.com/office/powerpoint/2010/main">
-    <mc:Choice Requires="p14">
+  <mc:AlternateContent xmlns:mc="http://schemas.openxmlformats.org/markup-compatibility/2006">
+    <mc:Choice xmlns:p14="http://schemas.microsoft.com/office/powerpoint/2010/main" Requires="p14">
       <p:transition spd="med" p14:dur="700">
         <p:fade/>
       </p:transition>
     </mc:Choice>
-    <mc:Fallback xmlns="">
+    <mc:Fallback>
       <p:transition spd="med">
         <p:fade/>
       </p:transition>
@@ -1831,6 +1788,7 @@
               <a:rPr lang="en-US"/>
               <a:t>Click to edit Master title style</a:t>
             </a:r>
+            <a:endParaRPr lang="en-US"/>
           </a:p>
         </p:txBody>
       </p:sp>
@@ -1859,6 +1817,7 @@
               <a:rPr lang="en-US"/>
               <a:t>Click to edit Master text styles</a:t>
             </a:r>
+            <a:endParaRPr lang="en-US"/>
           </a:p>
           <a:p>
             <a:pPr lvl="1"/>
@@ -1866,6 +1825,7 @@
               <a:rPr lang="en-US"/>
               <a:t>Second level</a:t>
             </a:r>
+            <a:endParaRPr lang="en-US"/>
           </a:p>
           <a:p>
             <a:pPr lvl="2"/>
@@ -1873,6 +1833,7 @@
               <a:rPr lang="en-US"/>
               <a:t>Third level</a:t>
             </a:r>
+            <a:endParaRPr lang="en-US"/>
           </a:p>
           <a:p>
             <a:pPr lvl="3"/>
@@ -1880,6 +1841,7 @@
               <a:rPr lang="en-US"/>
               <a:t>Fourth level</a:t>
             </a:r>
+            <a:endParaRPr lang="en-US"/>
           </a:p>
           <a:p>
             <a:pPr lvl="4"/>
@@ -1887,6 +1849,7 @@
               <a:rPr lang="en-US"/>
               <a:t>Fifth level</a:t>
             </a:r>
+            <a:endParaRPr lang="en-US"/>
           </a:p>
         </p:txBody>
       </p:sp>
@@ -1907,7 +1870,6 @@
           <a:p>
             <a:fld id="{47C8330A-A046-467A-9D75-3F2CDB9E8E27}" type="datetimeFigureOut">
               <a:rPr lang="en-US" smtClean="0"/>
-              <a:t>6/10/2023</a:t>
             </a:fld>
             <a:endParaRPr lang="en-US"/>
           </a:p>
@@ -1949,7 +1911,6 @@
           <a:p>
             <a:fld id="{E14535C2-0B7C-4279-BD60-7740349214BA}" type="slidenum">
               <a:rPr lang="en-US" smtClean="0"/>
-              <a:t>‹#›</a:t>
             </a:fld>
             <a:endParaRPr lang="en-US"/>
           </a:p>
@@ -1960,13 +1921,13 @@
   <p:clrMapOvr>
     <a:masterClrMapping/>
   </p:clrMapOvr>
-  <mc:AlternateContent xmlns:mc="http://schemas.openxmlformats.org/markup-compatibility/2006" xmlns:p14="http://schemas.microsoft.com/office/powerpoint/2010/main">
-    <mc:Choice Requires="p14">
+  <mc:AlternateContent xmlns:mc="http://schemas.openxmlformats.org/markup-compatibility/2006">
+    <mc:Choice xmlns:p14="http://schemas.microsoft.com/office/powerpoint/2010/main" Requires="p14">
       <p:transition spd="med" p14:dur="700">
         <p:fade/>
       </p:transition>
     </mc:Choice>
-    <mc:Fallback xmlns="">
+    <mc:Fallback>
       <p:transition spd="med">
         <p:fade/>
       </p:transition>
@@ -2011,6 +1972,7 @@
               <a:rPr lang="en-US"/>
               <a:t>Click to edit Master title style</a:t>
             </a:r>
+            <a:endParaRPr lang="en-US"/>
           </a:p>
         </p:txBody>
       </p:sp>
@@ -2034,6 +1996,7 @@
               <a:rPr lang="en-US"/>
               <a:t>Click to edit Master text styles</a:t>
             </a:r>
+            <a:endParaRPr lang="en-US"/>
           </a:p>
           <a:p>
             <a:pPr lvl="1"/>
@@ -2041,6 +2004,7 @@
               <a:rPr lang="en-US"/>
               <a:t>Second level</a:t>
             </a:r>
+            <a:endParaRPr lang="en-US"/>
           </a:p>
           <a:p>
             <a:pPr lvl="2"/>
@@ -2048,6 +2012,7 @@
               <a:rPr lang="en-US"/>
               <a:t>Third level</a:t>
             </a:r>
+            <a:endParaRPr lang="en-US"/>
           </a:p>
           <a:p>
             <a:pPr lvl="3"/>
@@ -2055,6 +2020,7 @@
               <a:rPr lang="en-US"/>
               <a:t>Fourth level</a:t>
             </a:r>
+            <a:endParaRPr lang="en-US"/>
           </a:p>
           <a:p>
             <a:pPr lvl="4"/>
@@ -2062,6 +2028,7 @@
               <a:rPr lang="en-US"/>
               <a:t>Fifth level</a:t>
             </a:r>
+            <a:endParaRPr lang="en-US"/>
           </a:p>
         </p:txBody>
       </p:sp>
@@ -2082,7 +2049,6 @@
           <a:p>
             <a:fld id="{47C8330A-A046-467A-9D75-3F2CDB9E8E27}" type="datetimeFigureOut">
               <a:rPr lang="en-US" smtClean="0"/>
-              <a:t>6/10/2023</a:t>
             </a:fld>
             <a:endParaRPr lang="en-US"/>
           </a:p>
@@ -2124,7 +2090,6 @@
           <a:p>
             <a:fld id="{E14535C2-0B7C-4279-BD60-7740349214BA}" type="slidenum">
               <a:rPr lang="en-US" smtClean="0"/>
-              <a:t>‹#›</a:t>
             </a:fld>
             <a:endParaRPr lang="en-US"/>
           </a:p>
@@ -2135,13 +2100,13 @@
   <p:clrMapOvr>
     <a:masterClrMapping/>
   </p:clrMapOvr>
-  <mc:AlternateContent xmlns:mc="http://schemas.openxmlformats.org/markup-compatibility/2006" xmlns:p14="http://schemas.microsoft.com/office/powerpoint/2010/main">
-    <mc:Choice Requires="p14">
+  <mc:AlternateContent xmlns:mc="http://schemas.openxmlformats.org/markup-compatibility/2006">
+    <mc:Choice xmlns:p14="http://schemas.microsoft.com/office/powerpoint/2010/main" Requires="p14">
       <p:transition spd="med" p14:dur="700">
         <p:fade/>
       </p:transition>
     </mc:Choice>
-    <mc:Fallback xmlns="">
+    <mc:Fallback>
       <p:transition spd="med">
         <p:fade/>
       </p:transition>
@@ -2195,6 +2160,7 @@
               <a:rPr lang="en-US"/>
               <a:t>Click to edit Master title style</a:t>
             </a:r>
+            <a:endParaRPr lang="en-US"/>
           </a:p>
         </p:txBody>
       </p:sp>
@@ -2314,6 +2280,7 @@
               <a:rPr lang="en-US"/>
               <a:t>Click to edit Master text styles</a:t>
             </a:r>
+            <a:endParaRPr lang="en-US"/>
           </a:p>
         </p:txBody>
       </p:sp>
@@ -2334,7 +2301,6 @@
           <a:p>
             <a:fld id="{47C8330A-A046-467A-9D75-3F2CDB9E8E27}" type="datetimeFigureOut">
               <a:rPr lang="en-US" smtClean="0"/>
-              <a:t>6/10/2023</a:t>
             </a:fld>
             <a:endParaRPr lang="en-US"/>
           </a:p>
@@ -2376,7 +2342,6 @@
           <a:p>
             <a:fld id="{E14535C2-0B7C-4279-BD60-7740349214BA}" type="slidenum">
               <a:rPr lang="en-US" smtClean="0"/>
-              <a:t>‹#›</a:t>
             </a:fld>
             <a:endParaRPr lang="en-US"/>
           </a:p>
@@ -2387,13 +2352,13 @@
   <p:clrMapOvr>
     <a:masterClrMapping/>
   </p:clrMapOvr>
-  <mc:AlternateContent xmlns:mc="http://schemas.openxmlformats.org/markup-compatibility/2006" xmlns:p14="http://schemas.microsoft.com/office/powerpoint/2010/main">
-    <mc:Choice Requires="p14">
+  <mc:AlternateContent xmlns:mc="http://schemas.openxmlformats.org/markup-compatibility/2006">
+    <mc:Choice xmlns:p14="http://schemas.microsoft.com/office/powerpoint/2010/main" Requires="p14">
       <p:transition spd="med" p14:dur="700">
         <p:fade/>
       </p:transition>
     </mc:Choice>
-    <mc:Fallback xmlns="">
+    <mc:Fallback>
       <p:transition spd="med">
         <p:fade/>
       </p:transition>
@@ -2438,6 +2403,7 @@
               <a:rPr lang="en-US"/>
               <a:t>Click to edit Master title style</a:t>
             </a:r>
+            <a:endParaRPr lang="en-US"/>
           </a:p>
         </p:txBody>
       </p:sp>
@@ -2466,6 +2432,7 @@
               <a:rPr lang="en-US"/>
               <a:t>Click to edit Master text styles</a:t>
             </a:r>
+            <a:endParaRPr lang="en-US"/>
           </a:p>
           <a:p>
             <a:pPr lvl="1"/>
@@ -2473,6 +2440,7 @@
               <a:rPr lang="en-US"/>
               <a:t>Second level</a:t>
             </a:r>
+            <a:endParaRPr lang="en-US"/>
           </a:p>
           <a:p>
             <a:pPr lvl="2"/>
@@ -2480,6 +2448,7 @@
               <a:rPr lang="en-US"/>
               <a:t>Third level</a:t>
             </a:r>
+            <a:endParaRPr lang="en-US"/>
           </a:p>
           <a:p>
             <a:pPr lvl="3"/>
@@ -2487,6 +2456,7 @@
               <a:rPr lang="en-US"/>
               <a:t>Fourth level</a:t>
             </a:r>
+            <a:endParaRPr lang="en-US"/>
           </a:p>
           <a:p>
             <a:pPr lvl="4"/>
@@ -2494,6 +2464,7 @@
               <a:rPr lang="en-US"/>
               <a:t>Fifth level</a:t>
             </a:r>
+            <a:endParaRPr lang="en-US"/>
           </a:p>
         </p:txBody>
       </p:sp>
@@ -2522,6 +2493,7 @@
               <a:rPr lang="en-US"/>
               <a:t>Click to edit Master text styles</a:t>
             </a:r>
+            <a:endParaRPr lang="en-US"/>
           </a:p>
           <a:p>
             <a:pPr lvl="1"/>
@@ -2529,6 +2501,7 @@
               <a:rPr lang="en-US"/>
               <a:t>Second level</a:t>
             </a:r>
+            <a:endParaRPr lang="en-US"/>
           </a:p>
           <a:p>
             <a:pPr lvl="2"/>
@@ -2536,6 +2509,7 @@
               <a:rPr lang="en-US"/>
               <a:t>Third level</a:t>
             </a:r>
+            <a:endParaRPr lang="en-US"/>
           </a:p>
           <a:p>
             <a:pPr lvl="3"/>
@@ -2543,6 +2517,7 @@
               <a:rPr lang="en-US"/>
               <a:t>Fourth level</a:t>
             </a:r>
+            <a:endParaRPr lang="en-US"/>
           </a:p>
           <a:p>
             <a:pPr lvl="4"/>
@@ -2550,6 +2525,7 @@
               <a:rPr lang="en-US"/>
               <a:t>Fifth level</a:t>
             </a:r>
+            <a:endParaRPr lang="en-US"/>
           </a:p>
         </p:txBody>
       </p:sp>
@@ -2570,7 +2546,6 @@
           <a:p>
             <a:fld id="{47C8330A-A046-467A-9D75-3F2CDB9E8E27}" type="datetimeFigureOut">
               <a:rPr lang="en-US" smtClean="0"/>
-              <a:t>6/10/2023</a:t>
             </a:fld>
             <a:endParaRPr lang="en-US"/>
           </a:p>
@@ -2612,7 +2587,6 @@
           <a:p>
             <a:fld id="{E14535C2-0B7C-4279-BD60-7740349214BA}" type="slidenum">
               <a:rPr lang="en-US" smtClean="0"/>
-              <a:t>‹#›</a:t>
             </a:fld>
             <a:endParaRPr lang="en-US"/>
           </a:p>
@@ -2623,13 +2597,13 @@
   <p:clrMapOvr>
     <a:masterClrMapping/>
   </p:clrMapOvr>
-  <mc:AlternateContent xmlns:mc="http://schemas.openxmlformats.org/markup-compatibility/2006" xmlns:p14="http://schemas.microsoft.com/office/powerpoint/2010/main">
-    <mc:Choice Requires="p14">
+  <mc:AlternateContent xmlns:mc="http://schemas.openxmlformats.org/markup-compatibility/2006">
+    <mc:Choice xmlns:p14="http://schemas.microsoft.com/office/powerpoint/2010/main" Requires="p14">
       <p:transition spd="med" p14:dur="700">
         <p:fade/>
       </p:transition>
     </mc:Choice>
-    <mc:Fallback xmlns="">
+    <mc:Fallback>
       <p:transition spd="med">
         <p:fade/>
       </p:transition>
@@ -2679,6 +2653,7 @@
               <a:rPr lang="en-US"/>
               <a:t>Click to edit Master title style</a:t>
             </a:r>
+            <a:endParaRPr lang="en-US"/>
           </a:p>
         </p:txBody>
       </p:sp>
@@ -2744,6 +2719,7 @@
               <a:rPr lang="en-US"/>
               <a:t>Click to edit Master text styles</a:t>
             </a:r>
+            <a:endParaRPr lang="en-US"/>
           </a:p>
         </p:txBody>
       </p:sp>
@@ -2772,6 +2748,7 @@
               <a:rPr lang="en-US"/>
               <a:t>Click to edit Master text styles</a:t>
             </a:r>
+            <a:endParaRPr lang="en-US"/>
           </a:p>
           <a:p>
             <a:pPr lvl="1"/>
@@ -2779,6 +2756,7 @@
               <a:rPr lang="en-US"/>
               <a:t>Second level</a:t>
             </a:r>
+            <a:endParaRPr lang="en-US"/>
           </a:p>
           <a:p>
             <a:pPr lvl="2"/>
@@ -2786,6 +2764,7 @@
               <a:rPr lang="en-US"/>
               <a:t>Third level</a:t>
             </a:r>
+            <a:endParaRPr lang="en-US"/>
           </a:p>
           <a:p>
             <a:pPr lvl="3"/>
@@ -2793,6 +2772,7 @@
               <a:rPr lang="en-US"/>
               <a:t>Fourth level</a:t>
             </a:r>
+            <a:endParaRPr lang="en-US"/>
           </a:p>
           <a:p>
             <a:pPr lvl="4"/>
@@ -2800,6 +2780,7 @@
               <a:rPr lang="en-US"/>
               <a:t>Fifth level</a:t>
             </a:r>
+            <a:endParaRPr lang="en-US"/>
           </a:p>
         </p:txBody>
       </p:sp>
@@ -2865,6 +2846,7 @@
               <a:rPr lang="en-US"/>
               <a:t>Click to edit Master text styles</a:t>
             </a:r>
+            <a:endParaRPr lang="en-US"/>
           </a:p>
         </p:txBody>
       </p:sp>
@@ -2893,6 +2875,7 @@
               <a:rPr lang="en-US"/>
               <a:t>Click to edit Master text styles</a:t>
             </a:r>
+            <a:endParaRPr lang="en-US"/>
           </a:p>
           <a:p>
             <a:pPr lvl="1"/>
@@ -2900,6 +2883,7 @@
               <a:rPr lang="en-US"/>
               <a:t>Second level</a:t>
             </a:r>
+            <a:endParaRPr lang="en-US"/>
           </a:p>
           <a:p>
             <a:pPr lvl="2"/>
@@ -2907,6 +2891,7 @@
               <a:rPr lang="en-US"/>
               <a:t>Third level</a:t>
             </a:r>
+            <a:endParaRPr lang="en-US"/>
           </a:p>
           <a:p>
             <a:pPr lvl="3"/>
@@ -2914,6 +2899,7 @@
               <a:rPr lang="en-US"/>
               <a:t>Fourth level</a:t>
             </a:r>
+            <a:endParaRPr lang="en-US"/>
           </a:p>
           <a:p>
             <a:pPr lvl="4"/>
@@ -2921,6 +2907,7 @@
               <a:rPr lang="en-US"/>
               <a:t>Fifth level</a:t>
             </a:r>
+            <a:endParaRPr lang="en-US"/>
           </a:p>
         </p:txBody>
       </p:sp>
@@ -2941,7 +2928,6 @@
           <a:p>
             <a:fld id="{47C8330A-A046-467A-9D75-3F2CDB9E8E27}" type="datetimeFigureOut">
               <a:rPr lang="en-US" smtClean="0"/>
-              <a:t>6/10/2023</a:t>
             </a:fld>
             <a:endParaRPr lang="en-US"/>
           </a:p>
@@ -2983,7 +2969,6 @@
           <a:p>
             <a:fld id="{E14535C2-0B7C-4279-BD60-7740349214BA}" type="slidenum">
               <a:rPr lang="en-US" smtClean="0"/>
-              <a:t>‹#›</a:t>
             </a:fld>
             <a:endParaRPr lang="en-US"/>
           </a:p>
@@ -2994,13 +2979,13 @@
   <p:clrMapOvr>
     <a:masterClrMapping/>
   </p:clrMapOvr>
-  <mc:AlternateContent xmlns:mc="http://schemas.openxmlformats.org/markup-compatibility/2006" xmlns:p14="http://schemas.microsoft.com/office/powerpoint/2010/main">
-    <mc:Choice Requires="p14">
+  <mc:AlternateContent xmlns:mc="http://schemas.openxmlformats.org/markup-compatibility/2006">
+    <mc:Choice xmlns:p14="http://schemas.microsoft.com/office/powerpoint/2010/main" Requires="p14">
       <p:transition spd="med" p14:dur="700">
         <p:fade/>
       </p:transition>
     </mc:Choice>
-    <mc:Fallback xmlns="">
+    <mc:Fallback>
       <p:transition spd="med">
         <p:fade/>
       </p:transition>
@@ -3045,6 +3030,7 @@
               <a:rPr lang="en-US"/>
               <a:t>Click to edit Master title style</a:t>
             </a:r>
+            <a:endParaRPr lang="en-US"/>
           </a:p>
         </p:txBody>
       </p:sp>
@@ -3065,7 +3051,6 @@
           <a:p>
             <a:fld id="{47C8330A-A046-467A-9D75-3F2CDB9E8E27}" type="datetimeFigureOut">
               <a:rPr lang="en-US" smtClean="0"/>
-              <a:t>6/10/2023</a:t>
             </a:fld>
             <a:endParaRPr lang="en-US"/>
           </a:p>
@@ -3107,7 +3092,6 @@
           <a:p>
             <a:fld id="{E14535C2-0B7C-4279-BD60-7740349214BA}" type="slidenum">
               <a:rPr lang="en-US" smtClean="0"/>
-              <a:t>‹#›</a:t>
             </a:fld>
             <a:endParaRPr lang="en-US"/>
           </a:p>
@@ -3118,13 +3102,13 @@
   <p:clrMapOvr>
     <a:masterClrMapping/>
   </p:clrMapOvr>
-  <mc:AlternateContent xmlns:mc="http://schemas.openxmlformats.org/markup-compatibility/2006" xmlns:p14="http://schemas.microsoft.com/office/powerpoint/2010/main">
-    <mc:Choice Requires="p14">
+  <mc:AlternateContent xmlns:mc="http://schemas.openxmlformats.org/markup-compatibility/2006">
+    <mc:Choice xmlns:p14="http://schemas.microsoft.com/office/powerpoint/2010/main" Requires="p14">
       <p:transition spd="med" p14:dur="700">
         <p:fade/>
       </p:transition>
     </mc:Choice>
-    <mc:Fallback xmlns="">
+    <mc:Fallback>
       <p:transition spd="med">
         <p:fade/>
       </p:transition>
@@ -3167,7 +3151,6 @@
           <a:p>
             <a:fld id="{47C8330A-A046-467A-9D75-3F2CDB9E8E27}" type="datetimeFigureOut">
               <a:rPr lang="en-US" smtClean="0"/>
-              <a:t>6/10/2023</a:t>
             </a:fld>
             <a:endParaRPr lang="en-US"/>
           </a:p>
@@ -3209,7 +3192,6 @@
           <a:p>
             <a:fld id="{E14535C2-0B7C-4279-BD60-7740349214BA}" type="slidenum">
               <a:rPr lang="en-US" smtClean="0"/>
-              <a:t>‹#›</a:t>
             </a:fld>
             <a:endParaRPr lang="en-US"/>
           </a:p>
@@ -3220,13 +3202,13 @@
   <p:clrMapOvr>
     <a:masterClrMapping/>
   </p:clrMapOvr>
-  <mc:AlternateContent xmlns:mc="http://schemas.openxmlformats.org/markup-compatibility/2006" xmlns:p14="http://schemas.microsoft.com/office/powerpoint/2010/main">
-    <mc:Choice Requires="p14">
+  <mc:AlternateContent xmlns:mc="http://schemas.openxmlformats.org/markup-compatibility/2006">
+    <mc:Choice xmlns:p14="http://schemas.microsoft.com/office/powerpoint/2010/main" Requires="p14">
       <p:transition spd="med" p14:dur="700">
         <p:fade/>
       </p:transition>
     </mc:Choice>
-    <mc:Fallback xmlns="">
+    <mc:Fallback>
       <p:transition spd="med">
         <p:fade/>
       </p:transition>
@@ -3280,6 +3262,7 @@
               <a:rPr lang="en-US"/>
               <a:t>Click to edit Master title style</a:t>
             </a:r>
+            <a:endParaRPr lang="en-US"/>
           </a:p>
         </p:txBody>
       </p:sp>
@@ -3336,6 +3319,7 @@
               <a:rPr lang="en-US"/>
               <a:t>Click to edit Master text styles</a:t>
             </a:r>
+            <a:endParaRPr lang="en-US"/>
           </a:p>
           <a:p>
             <a:pPr lvl="1"/>
@@ -3343,6 +3327,7 @@
               <a:rPr lang="en-US"/>
               <a:t>Second level</a:t>
             </a:r>
+            <a:endParaRPr lang="en-US"/>
           </a:p>
           <a:p>
             <a:pPr lvl="2"/>
@@ -3350,6 +3335,7 @@
               <a:rPr lang="en-US"/>
               <a:t>Third level</a:t>
             </a:r>
+            <a:endParaRPr lang="en-US"/>
           </a:p>
           <a:p>
             <a:pPr lvl="3"/>
@@ -3357,6 +3343,7 @@
               <a:rPr lang="en-US"/>
               <a:t>Fourth level</a:t>
             </a:r>
+            <a:endParaRPr lang="en-US"/>
           </a:p>
           <a:p>
             <a:pPr lvl="4"/>
@@ -3364,6 +3351,7 @@
               <a:rPr lang="en-US"/>
               <a:t>Fifth level</a:t>
             </a:r>
+            <a:endParaRPr lang="en-US"/>
           </a:p>
         </p:txBody>
       </p:sp>
@@ -3429,6 +3417,7 @@
               <a:rPr lang="en-US"/>
               <a:t>Click to edit Master text styles</a:t>
             </a:r>
+            <a:endParaRPr lang="en-US"/>
           </a:p>
         </p:txBody>
       </p:sp>
@@ -3449,7 +3438,6 @@
           <a:p>
             <a:fld id="{47C8330A-A046-467A-9D75-3F2CDB9E8E27}" type="datetimeFigureOut">
               <a:rPr lang="en-US" smtClean="0"/>
-              <a:t>6/10/2023</a:t>
             </a:fld>
             <a:endParaRPr lang="en-US"/>
           </a:p>
@@ -3491,7 +3479,6 @@
           <a:p>
             <a:fld id="{E14535C2-0B7C-4279-BD60-7740349214BA}" type="slidenum">
               <a:rPr lang="en-US" smtClean="0"/>
-              <a:t>‹#›</a:t>
             </a:fld>
             <a:endParaRPr lang="en-US"/>
           </a:p>
@@ -3502,13 +3489,13 @@
   <p:clrMapOvr>
     <a:masterClrMapping/>
   </p:clrMapOvr>
-  <mc:AlternateContent xmlns:mc="http://schemas.openxmlformats.org/markup-compatibility/2006" xmlns:p14="http://schemas.microsoft.com/office/powerpoint/2010/main">
-    <mc:Choice Requires="p14">
+  <mc:AlternateContent xmlns:mc="http://schemas.openxmlformats.org/markup-compatibility/2006">
+    <mc:Choice xmlns:p14="http://schemas.microsoft.com/office/powerpoint/2010/main" Requires="p14">
       <p:transition spd="med" p14:dur="700">
         <p:fade/>
       </p:transition>
     </mc:Choice>
-    <mc:Fallback xmlns="">
+    <mc:Fallback>
       <p:transition spd="med">
         <p:fade/>
       </p:transition>
@@ -3562,6 +3549,7 @@
               <a:rPr lang="en-US"/>
               <a:t>Click to edit Master title style</a:t>
             </a:r>
+            <a:endParaRPr lang="en-US"/>
           </a:p>
         </p:txBody>
       </p:sp>
@@ -3688,6 +3676,7 @@
               <a:rPr lang="en-US"/>
               <a:t>Click to edit Master text styles</a:t>
             </a:r>
+            <a:endParaRPr lang="en-US"/>
           </a:p>
         </p:txBody>
       </p:sp>
@@ -3708,7 +3697,6 @@
           <a:p>
             <a:fld id="{47C8330A-A046-467A-9D75-3F2CDB9E8E27}" type="datetimeFigureOut">
               <a:rPr lang="en-US" smtClean="0"/>
-              <a:t>6/10/2023</a:t>
             </a:fld>
             <a:endParaRPr lang="en-US"/>
           </a:p>
@@ -3750,7 +3738,6 @@
           <a:p>
             <a:fld id="{E14535C2-0B7C-4279-BD60-7740349214BA}" type="slidenum">
               <a:rPr lang="en-US" smtClean="0"/>
-              <a:t>‹#›</a:t>
             </a:fld>
             <a:endParaRPr lang="en-US"/>
           </a:p>
@@ -3761,13 +3748,13 @@
   <p:clrMapOvr>
     <a:masterClrMapping/>
   </p:clrMapOvr>
-  <mc:AlternateContent xmlns:mc="http://schemas.openxmlformats.org/markup-compatibility/2006" xmlns:p14="http://schemas.microsoft.com/office/powerpoint/2010/main">
-    <mc:Choice Requires="p14">
+  <mc:AlternateContent xmlns:mc="http://schemas.openxmlformats.org/markup-compatibility/2006">
+    <mc:Choice xmlns:p14="http://schemas.microsoft.com/office/powerpoint/2010/main" Requires="p14">
       <p:transition spd="med" p14:dur="700">
         <p:fade/>
       </p:transition>
     </mc:Choice>
-    <mc:Fallback xmlns="">
+    <mc:Fallback>
       <p:transition spd="med">
         <p:fade/>
       </p:transition>
@@ -3782,7 +3769,7 @@
     <p:bg>
       <p:bgPr>
         <a:blipFill dpi="0" rotWithShape="1">
-          <a:blip r:embed="rId13">
+          <a:blip r:embed="rId12">
             <a:lum/>
           </a:blip>
           <a:srcRect/>
@@ -3836,6 +3823,7 @@
               <a:rPr lang="en-US"/>
               <a:t>Click to edit Master title style</a:t>
             </a:r>
+            <a:endParaRPr lang="en-US"/>
           </a:p>
         </p:txBody>
       </p:sp>
@@ -3869,6 +3857,7 @@
               <a:rPr lang="en-US"/>
               <a:t>Click to edit Master text styles</a:t>
             </a:r>
+            <a:endParaRPr lang="en-US"/>
           </a:p>
           <a:p>
             <a:pPr lvl="1"/>
@@ -3876,6 +3865,7 @@
               <a:rPr lang="en-US"/>
               <a:t>Second level</a:t>
             </a:r>
+            <a:endParaRPr lang="en-US"/>
           </a:p>
           <a:p>
             <a:pPr lvl="2"/>
@@ -3883,6 +3873,7 @@
               <a:rPr lang="en-US"/>
               <a:t>Third level</a:t>
             </a:r>
+            <a:endParaRPr lang="en-US"/>
           </a:p>
           <a:p>
             <a:pPr lvl="3"/>
@@ -3890,6 +3881,7 @@
               <a:rPr lang="en-US"/>
               <a:t>Fourth level</a:t>
             </a:r>
+            <a:endParaRPr lang="en-US"/>
           </a:p>
           <a:p>
             <a:pPr lvl="4"/>
@@ -3897,6 +3889,7 @@
               <a:rPr lang="en-US"/>
               <a:t>Fifth level</a:t>
             </a:r>
+            <a:endParaRPr lang="en-US"/>
           </a:p>
         </p:txBody>
       </p:sp>
@@ -3935,7 +3928,6 @@
           <a:p>
             <a:fld id="{47C8330A-A046-467A-9D75-3F2CDB9E8E27}" type="datetimeFigureOut">
               <a:rPr lang="en-US" smtClean="0"/>
-              <a:t>6/10/2023</a:t>
             </a:fld>
             <a:endParaRPr lang="en-US"/>
           </a:p>
@@ -4013,7 +4005,6 @@
           <a:p>
             <a:fld id="{E14535C2-0B7C-4279-BD60-7740349214BA}" type="slidenum">
               <a:rPr lang="en-US" smtClean="0"/>
-              <a:t>‹#›</a:t>
             </a:fld>
             <a:endParaRPr lang="en-US"/>
           </a:p>
@@ -4035,13 +4026,13 @@
     <p:sldLayoutId id="2147483658" r:id="rId10"/>
     <p:sldLayoutId id="2147483659" r:id="rId11"/>
   </p:sldLayoutIdLst>
-  <mc:AlternateContent xmlns:mc="http://schemas.openxmlformats.org/markup-compatibility/2006" xmlns:p14="http://schemas.microsoft.com/office/powerpoint/2010/main">
-    <mc:Choice Requires="p14">
+  <mc:AlternateContent xmlns:mc="http://schemas.openxmlformats.org/markup-compatibility/2006">
+    <mc:Choice xmlns:p14="http://schemas.microsoft.com/office/powerpoint/2010/main" Requires="p14">
       <p:transition spd="med" p14:dur="700">
         <p:fade/>
       </p:transition>
     </mc:Choice>
-    <mc:Fallback xmlns="">
+    <mc:Fallback>
       <p:transition spd="med">
         <p:fade/>
       </p:transition>
@@ -4383,6 +4374,7 @@
               <a:rPr lang="en-US" sz="3200" b="1" dirty="0"/>
               <a:t>detection using hybrid neural network” Using Eyapacs Dataset</a:t>
             </a:r>
+            <a:endParaRPr lang="en-US" sz="3200" b="1" dirty="0"/>
           </a:p>
         </p:txBody>
       </p:sp>
@@ -4415,6 +4407,7 @@
               <a:rPr lang="en-US" sz="1800" dirty="0"/>
               <a:t>: </a:t>
             </a:r>
+            <a:endParaRPr lang="en-US" sz="1800" dirty="0"/>
           </a:p>
           <a:p>
             <a:pPr algn="l"/>
@@ -4430,6 +4423,7 @@
               <a:rPr lang="en-US" sz="1800" dirty="0"/>
               <a:t> (6025222002)</a:t>
             </a:r>
+            <a:endParaRPr lang="en-US" sz="1800" dirty="0"/>
           </a:p>
           <a:p>
             <a:pPr algn="l"/>
@@ -4437,6 +4431,7 @@
               <a:rPr lang="en-US" sz="1800" dirty="0"/>
               <a:t>Zelli Ghea Mardi Anugrah (6025222014)</a:t>
             </a:r>
+            <a:endParaRPr lang="en-US" sz="1800" dirty="0"/>
           </a:p>
           <a:p>
             <a:endParaRPr lang="en-US" dirty="0"/>
@@ -4448,13 +4443,13 @@
   <p:clrMapOvr>
     <a:masterClrMapping/>
   </p:clrMapOvr>
-  <mc:AlternateContent xmlns:mc="http://schemas.openxmlformats.org/markup-compatibility/2006" xmlns:p14="http://schemas.microsoft.com/office/powerpoint/2010/main">
-    <mc:Choice Requires="p14">
+  <mc:AlternateContent xmlns:mc="http://schemas.openxmlformats.org/markup-compatibility/2006">
+    <mc:Choice xmlns:p14="http://schemas.microsoft.com/office/powerpoint/2010/main" Requires="p14">
       <p:transition spd="med" p14:dur="700">
         <p:fade/>
       </p:transition>
     </mc:Choice>
-    <mc:Fallback xmlns="">
+    <mc:Fallback>
       <p:transition spd="med">
         <p:fade/>
       </p:transition>
@@ -4526,6 +4521,7 @@
               <a:rPr lang="en-ID" i="1" dirty="0"/>
               <a:t>Hybrid Neural Network</a:t>
             </a:r>
+            <a:endParaRPr lang="en-ID" i="1" dirty="0"/>
           </a:p>
           <a:p>
             <a:pPr marL="627380" lvl="1" indent="-265430" algn="just"/>
@@ -4625,6 +4621,7 @@
               <a:rPr lang="en-ID" dirty="0"/>
               <a:t>.</a:t>
             </a:r>
+            <a:endParaRPr lang="en-ID" dirty="0"/>
           </a:p>
           <a:p>
             <a:pPr marL="627380" lvl="1" indent="-265430" algn="just"/>
@@ -4641,7 +4638,7 @@
           <p:nvPr/>
         </p:nvPicPr>
         <p:blipFill rotWithShape="1">
-          <a:blip r:embed="rId2"/>
+          <a:blip r:embed="rId1"/>
           <a:srcRect b="11959"/>
           <a:stretch>
             <a:fillRect/>
@@ -4662,13 +4659,13 @@
   <p:clrMapOvr>
     <a:masterClrMapping/>
   </p:clrMapOvr>
-  <mc:AlternateContent xmlns:mc="http://schemas.openxmlformats.org/markup-compatibility/2006" xmlns:p14="http://schemas.microsoft.com/office/powerpoint/2010/main">
-    <mc:Choice Requires="p14">
+  <mc:AlternateContent xmlns:mc="http://schemas.openxmlformats.org/markup-compatibility/2006">
+    <mc:Choice xmlns:p14="http://schemas.microsoft.com/office/powerpoint/2010/main" Requires="p14">
       <p:transition spd="med" p14:dur="700">
         <p:fade/>
       </p:transition>
     </mc:Choice>
-    <mc:Fallback xmlns="">
+    <mc:Fallback>
       <p:transition spd="med">
         <p:fade/>
       </p:transition>
@@ -4968,111 +4965,112 @@
               <a:rPr lang="en-ID" i="1" dirty="0"/>
               <a:t>Hybrid Neural Network</a:t>
             </a:r>
-          </a:p>
-          <a:p>
-            <a:pPr marL="627380" lvl="1" indent="-265430" algn="just"/>
-            <a:r>
-              <a:rPr lang="en-ID" i="1" dirty="0"/>
-              <a:t>Model</a:t>
-            </a:r>
-            <a:r>
-              <a:rPr lang="en-ID" dirty="0"/>
-              <a:t> yang </a:t>
-            </a:r>
-            <a:r>
-              <a:rPr lang="en-ID" dirty="0" err="1"/>
-              <a:t>digunakan</a:t>
-            </a:r>
-            <a:r>
-              <a:rPr lang="en-ID" dirty="0"/>
-              <a:t> pada </a:t>
-            </a:r>
-            <a:r>
-              <a:rPr lang="en-ID" dirty="0" err="1"/>
-              <a:t>penelitian</a:t>
-            </a:r>
-            <a:r>
-              <a:rPr lang="en-ID" dirty="0"/>
-              <a:t> </a:t>
-            </a:r>
-            <a:r>
-              <a:rPr lang="en-ID" dirty="0" err="1"/>
-              <a:t>ini</a:t>
-            </a:r>
-            <a:r>
-              <a:rPr lang="en-ID" dirty="0"/>
-              <a:t> </a:t>
-            </a:r>
-            <a:r>
-              <a:rPr lang="en-ID" dirty="0" err="1"/>
-              <a:t>terdiri</a:t>
-            </a:r>
-            <a:r>
-              <a:rPr lang="en-ID" dirty="0"/>
-              <a:t> </a:t>
-            </a:r>
-            <a:r>
-              <a:rPr lang="en-ID" dirty="0" err="1"/>
-              <a:t>dari</a:t>
-            </a:r>
-            <a:r>
-              <a:rPr lang="en-ID" dirty="0"/>
-              <a:t> dua model </a:t>
-            </a:r>
-            <a:r>
-              <a:rPr lang="en-ID" i="1" dirty="0"/>
-              <a:t>neural network</a:t>
-            </a:r>
-            <a:r>
-              <a:rPr lang="en-ID" dirty="0"/>
-              <a:t>, </a:t>
-            </a:r>
-            <a:r>
-              <a:rPr lang="en-ID" dirty="0" err="1"/>
-              <a:t>karena</a:t>
-            </a:r>
-            <a:r>
-              <a:rPr lang="en-ID" dirty="0"/>
-              <a:t> </a:t>
-            </a:r>
-            <a:r>
-              <a:rPr lang="en-ID" dirty="0" err="1"/>
-              <a:t>itu</a:t>
-            </a:r>
-            <a:r>
-              <a:rPr lang="en-ID" dirty="0"/>
-              <a:t> </a:t>
-            </a:r>
-            <a:r>
-              <a:rPr lang="en-ID" dirty="0" err="1"/>
-              <a:t>disebut</a:t>
-            </a:r>
-            <a:r>
-              <a:rPr lang="en-ID" dirty="0"/>
-              <a:t> </a:t>
-            </a:r>
-            <a:r>
-              <a:rPr lang="en-ID" dirty="0" err="1"/>
-              <a:t>dengan</a:t>
-            </a:r>
-            <a:r>
-              <a:rPr lang="en-ID" dirty="0"/>
-              <a:t> </a:t>
-            </a:r>
-            <a:r>
-              <a:rPr lang="en-ID" i="1" dirty="0"/>
-              <a:t>hybrid neural network</a:t>
-            </a:r>
-            <a:r>
-              <a:rPr lang="en-ID" dirty="0"/>
-              <a:t>.</a:t>
-            </a:r>
             <a:endParaRPr lang="en-ID" i="1" dirty="0"/>
           </a:p>
           <a:p>
             <a:pPr marL="627380" lvl="1" indent="-265430" algn="just"/>
             <a:r>
               <a:rPr lang="en-ID" i="1" dirty="0"/>
+              <a:t>Model</a:t>
+            </a:r>
+            <a:r>
+              <a:rPr lang="en-ID" dirty="0"/>
+              <a:t> yang </a:t>
+            </a:r>
+            <a:r>
+              <a:rPr lang="en-ID" dirty="0" err="1"/>
+              <a:t>digunakan</a:t>
+            </a:r>
+            <a:r>
+              <a:rPr lang="en-ID" dirty="0"/>
+              <a:t> pada </a:t>
+            </a:r>
+            <a:r>
+              <a:rPr lang="en-ID" dirty="0" err="1"/>
+              <a:t>penelitian</a:t>
+            </a:r>
+            <a:r>
+              <a:rPr lang="en-ID" dirty="0"/>
+              <a:t> </a:t>
+            </a:r>
+            <a:r>
+              <a:rPr lang="en-ID" dirty="0" err="1"/>
+              <a:t>ini</a:t>
+            </a:r>
+            <a:r>
+              <a:rPr lang="en-ID" dirty="0"/>
+              <a:t> </a:t>
+            </a:r>
+            <a:r>
+              <a:rPr lang="en-ID" dirty="0" err="1"/>
+              <a:t>terdiri</a:t>
+            </a:r>
+            <a:r>
+              <a:rPr lang="en-ID" dirty="0"/>
+              <a:t> </a:t>
+            </a:r>
+            <a:r>
+              <a:rPr lang="en-ID" dirty="0" err="1"/>
+              <a:t>dari</a:t>
+            </a:r>
+            <a:r>
+              <a:rPr lang="en-ID" dirty="0"/>
+              <a:t> dua model </a:t>
+            </a:r>
+            <a:r>
+              <a:rPr lang="en-ID" i="1" dirty="0"/>
+              <a:t>neural network</a:t>
+            </a:r>
+            <a:r>
+              <a:rPr lang="en-ID" dirty="0"/>
+              <a:t>, </a:t>
+            </a:r>
+            <a:r>
+              <a:rPr lang="en-ID" dirty="0" err="1"/>
+              <a:t>karena</a:t>
+            </a:r>
+            <a:r>
+              <a:rPr lang="en-ID" dirty="0"/>
+              <a:t> </a:t>
+            </a:r>
+            <a:r>
+              <a:rPr lang="en-ID" dirty="0" err="1"/>
+              <a:t>itu</a:t>
+            </a:r>
+            <a:r>
+              <a:rPr lang="en-ID" dirty="0"/>
+              <a:t> </a:t>
+            </a:r>
+            <a:r>
+              <a:rPr lang="en-ID" dirty="0" err="1"/>
+              <a:t>disebut</a:t>
+            </a:r>
+            <a:r>
+              <a:rPr lang="en-ID" dirty="0"/>
+              <a:t> </a:t>
+            </a:r>
+            <a:r>
+              <a:rPr lang="en-ID" dirty="0" err="1"/>
+              <a:t>dengan</a:t>
+            </a:r>
+            <a:r>
+              <a:rPr lang="en-ID" dirty="0"/>
+              <a:t> </a:t>
+            </a:r>
+            <a:r>
+              <a:rPr lang="en-ID" i="1" dirty="0"/>
+              <a:t>hybrid neural network</a:t>
+            </a:r>
+            <a:r>
+              <a:rPr lang="en-ID" dirty="0"/>
+              <a:t>.</a:t>
+            </a:r>
+            <a:endParaRPr lang="en-ID" i="1" dirty="0"/>
+          </a:p>
+          <a:p>
+            <a:pPr marL="627380" lvl="1" indent="-265430" algn="just"/>
+            <a:r>
+              <a:rPr lang="en-ID" i="1" dirty="0"/>
               <a:t>Neural network </a:t>
             </a:r>
             <a:r>
@@ -5195,6 +5193,7 @@
               <a:rPr lang="en-ID" dirty="0"/>
               <a:t>.</a:t>
             </a:r>
+            <a:endParaRPr lang="en-ID" dirty="0"/>
           </a:p>
         </p:txBody>
       </p:sp>
@@ -5207,7 +5206,7 @@
           <p:nvPr/>
         </p:nvPicPr>
         <p:blipFill>
-          <a:blip r:embed="rId2"/>
+          <a:blip r:embed="rId1"/>
           <a:stretch>
             <a:fillRect/>
           </a:stretch>
@@ -5337,7 +5336,7 @@
             <p:nvPr/>
           </p:nvPicPr>
           <p:blipFill>
-            <a:blip r:embed="rId3"/>
+            <a:blip r:embed="rId2"/>
             <a:stretch>
               <a:fillRect/>
             </a:stretch>
@@ -5427,7 +5426,7 @@
             <p:nvPr/>
           </p:nvPicPr>
           <p:blipFill>
-            <a:blip r:embed="rId4"/>
+            <a:blip r:embed="rId3"/>
             <a:stretch>
               <a:fillRect/>
             </a:stretch>
@@ -5499,13 +5498,13 @@
   <p:clrMapOvr>
     <a:masterClrMapping/>
   </p:clrMapOvr>
-  <mc:AlternateContent xmlns:mc="http://schemas.openxmlformats.org/markup-compatibility/2006" xmlns:p14="http://schemas.microsoft.com/office/powerpoint/2010/main">
-    <mc:Choice Requires="p14">
+  <mc:AlternateContent xmlns:mc="http://schemas.openxmlformats.org/markup-compatibility/2006">
+    <mc:Choice xmlns:p14="http://schemas.microsoft.com/office/powerpoint/2010/main" Requires="p14">
       <p:transition spd="med" p14:dur="700">
         <p:fade/>
       </p:transition>
     </mc:Choice>
-    <mc:Fallback xmlns="">
+    <mc:Fallback>
       <p:transition spd="med">
         <p:fade/>
       </p:transition>
@@ -5967,6 +5966,7 @@
               <a:rPr lang="en-ID" sz="2400" i="1" dirty="0"/>
               <a:t>Hybrid Neural Network</a:t>
             </a:r>
+            <a:endParaRPr lang="en-ID" sz="2400" i="1" dirty="0"/>
           </a:p>
           <a:p>
             <a:pPr marL="627380" lvl="1" indent="-265430" algn="just"/>
@@ -6194,6 +6194,7 @@
               <a:rPr lang="en-ID" sz="2000" dirty="0"/>
               <a:t>.</a:t>
             </a:r>
+            <a:endParaRPr lang="en-ID" sz="2000" dirty="0"/>
           </a:p>
           <a:p>
             <a:pPr marL="627380" lvl="1" indent="-265430" algn="just"/>
@@ -6301,6 +6302,7 @@
               <a:rPr lang="en-ID" sz="2000" dirty="0"/>
               <a:t>.</a:t>
             </a:r>
+            <a:endParaRPr lang="en-ID" sz="2000" dirty="0"/>
           </a:p>
         </p:txBody>
       </p:sp>
@@ -6327,7 +6329,7 @@
             <p:nvPr/>
           </p:nvPicPr>
           <p:blipFill>
-            <a:blip r:embed="rId2"/>
+            <a:blip r:embed="rId1"/>
             <a:stretch>
               <a:fillRect/>
             </a:stretch>
@@ -6399,13 +6401,13 @@
   <p:clrMapOvr>
     <a:masterClrMapping/>
   </p:clrMapOvr>
-  <mc:AlternateContent xmlns:mc="http://schemas.openxmlformats.org/markup-compatibility/2006" xmlns:p14="http://schemas.microsoft.com/office/powerpoint/2010/main">
-    <mc:Choice Requires="p14">
+  <mc:AlternateContent xmlns:mc="http://schemas.openxmlformats.org/markup-compatibility/2006">
+    <mc:Choice xmlns:p14="http://schemas.microsoft.com/office/powerpoint/2010/main" Requires="p14">
       <p:transition spd="med" p14:dur="700">
         <p:fade/>
       </p:transition>
     </mc:Choice>
-    <mc:Fallback xmlns="">
+    <mc:Fallback>
       <p:transition spd="med">
         <p:fade/>
       </p:transition>
@@ -6601,6 +6603,7 @@
               <a:rPr lang="en-ID" dirty="0"/>
               <a:t>:</a:t>
             </a:r>
+            <a:endParaRPr lang="en-ID" dirty="0"/>
           </a:p>
           <a:p>
             <a:pPr marL="355600" indent="-355600">
@@ -6671,6 +6674,7 @@
               <a:rPr lang="en-ID" dirty="0"/>
               <a:t>.</a:t>
             </a:r>
+            <a:endParaRPr lang="en-ID" dirty="0"/>
           </a:p>
           <a:p>
             <a:pPr marL="355600" indent="-355600">
@@ -6749,6 +6753,7 @@
               <a:rPr lang="en-ID" dirty="0"/>
               <a:t>.</a:t>
             </a:r>
+            <a:endParaRPr lang="en-ID" dirty="0"/>
           </a:p>
           <a:p>
             <a:pPr marL="355600" indent="-355600">
@@ -6835,6 +6840,7 @@
               <a:rPr lang="en-ID" dirty="0"/>
               <a:t>.</a:t>
             </a:r>
+            <a:endParaRPr lang="en-ID" dirty="0"/>
           </a:p>
           <a:p>
             <a:pPr marL="355600" indent="-355600">
@@ -6905,6 +6911,7 @@
               <a:rPr lang="en-ID" dirty="0"/>
               <a:t>.</a:t>
             </a:r>
+            <a:endParaRPr lang="en-ID" dirty="0"/>
           </a:p>
           <a:p>
             <a:pPr marL="355600" indent="-355600">
@@ -6967,6 +6974,7 @@
               <a:rPr lang="en-ID" dirty="0"/>
               <a:t>.</a:t>
             </a:r>
+            <a:endParaRPr lang="en-ID" dirty="0"/>
           </a:p>
           <a:p>
             <a:pPr marL="355600" indent="-355600">
@@ -7001,6 +7009,7 @@
               <a:rPr lang="en-ID" dirty="0"/>
               <a:t> dan Recall</a:t>
             </a:r>
+            <a:endParaRPr lang="en-ID" dirty="0"/>
           </a:p>
         </p:txBody>
       </p:sp>
@@ -7009,13 +7018,13 @@
   <p:clrMapOvr>
     <a:masterClrMapping/>
   </p:clrMapOvr>
-  <mc:AlternateContent xmlns:mc="http://schemas.openxmlformats.org/markup-compatibility/2006" xmlns:p14="http://schemas.microsoft.com/office/powerpoint/2010/main">
-    <mc:Choice Requires="p14">
+  <mc:AlternateContent xmlns:mc="http://schemas.openxmlformats.org/markup-compatibility/2006">
+    <mc:Choice xmlns:p14="http://schemas.microsoft.com/office/powerpoint/2010/main" Requires="p14">
       <p:transition spd="med" p14:dur="700">
         <p:fade/>
       </p:transition>
     </mc:Choice>
-    <mc:Fallback xmlns="">
+    <mc:Fallback>
       <p:transition spd="med">
         <p:fade/>
       </p:transition>
@@ -8132,83 +8141,17 @@
                 <a:tableStyleId>{5C22544A-7EE6-4342-B048-85BDC9FD1C3A}</a:tableStyleId>
               </a:tblPr>
               <a:tblGrid>
-                <a:gridCol w="740051">
-                  <a:extLst>
-                    <a:ext uri="{9D8B030D-6E8A-4147-A177-3AD203B41FA5}">
-                      <a16:colId xmlns:a16="http://schemas.microsoft.com/office/drawing/2014/main" val="20000"/>
-                    </a:ext>
-                  </a:extLst>
-                </a:gridCol>
-                <a:gridCol w="1290785">
-                  <a:extLst>
-                    <a:ext uri="{9D8B030D-6E8A-4147-A177-3AD203B41FA5}">
-                      <a16:colId xmlns:a16="http://schemas.microsoft.com/office/drawing/2014/main" val="20001"/>
-                    </a:ext>
-                  </a:extLst>
-                </a:gridCol>
-                <a:gridCol w="860524">
-                  <a:extLst>
-                    <a:ext uri="{9D8B030D-6E8A-4147-A177-3AD203B41FA5}">
-                      <a16:colId xmlns:a16="http://schemas.microsoft.com/office/drawing/2014/main" val="20002"/>
-                    </a:ext>
-                  </a:extLst>
-                </a:gridCol>
-                <a:gridCol w="843313">
-                  <a:extLst>
-                    <a:ext uri="{9D8B030D-6E8A-4147-A177-3AD203B41FA5}">
-                      <a16:colId xmlns:a16="http://schemas.microsoft.com/office/drawing/2014/main" val="20003"/>
-                    </a:ext>
-                  </a:extLst>
-                </a:gridCol>
-                <a:gridCol w="757260">
-                  <a:extLst>
-                    <a:ext uri="{9D8B030D-6E8A-4147-A177-3AD203B41FA5}">
-                      <a16:colId xmlns:a16="http://schemas.microsoft.com/office/drawing/2014/main" val="20004"/>
-                    </a:ext>
-                  </a:extLst>
-                </a:gridCol>
-                <a:gridCol w="705629">
-                  <a:extLst>
-                    <a:ext uri="{9D8B030D-6E8A-4147-A177-3AD203B41FA5}">
-                      <a16:colId xmlns:a16="http://schemas.microsoft.com/office/drawing/2014/main" val="20005"/>
-                    </a:ext>
-                  </a:extLst>
-                </a:gridCol>
-                <a:gridCol w="1135892">
-                  <a:extLst>
-                    <a:ext uri="{9D8B030D-6E8A-4147-A177-3AD203B41FA5}">
-                      <a16:colId xmlns:a16="http://schemas.microsoft.com/office/drawing/2014/main" val="20006"/>
-                    </a:ext>
-                  </a:extLst>
-                </a:gridCol>
-                <a:gridCol w="1135892">
-                  <a:extLst>
-                    <a:ext uri="{9D8B030D-6E8A-4147-A177-3AD203B41FA5}">
-                      <a16:colId xmlns:a16="http://schemas.microsoft.com/office/drawing/2014/main" val="20007"/>
-                    </a:ext>
-                  </a:extLst>
-                </a:gridCol>
-                <a:gridCol w="826102">
-                  <a:extLst>
-                    <a:ext uri="{9D8B030D-6E8A-4147-A177-3AD203B41FA5}">
-                      <a16:colId xmlns:a16="http://schemas.microsoft.com/office/drawing/2014/main" val="20008"/>
-                    </a:ext>
-                  </a:extLst>
-                </a:gridCol>
-                <a:gridCol w="860524">
-                  <a:extLst>
-                    <a:ext uri="{9D8B030D-6E8A-4147-A177-3AD203B41FA5}">
-                      <a16:colId xmlns:a16="http://schemas.microsoft.com/office/drawing/2014/main" val="20009"/>
-                    </a:ext>
-                  </a:extLst>
-                </a:gridCol>
-                <a:gridCol w="1359627">
-                  <a:extLst>
-                    <a:ext uri="{9D8B030D-6E8A-4147-A177-3AD203B41FA5}">
-                      <a16:colId xmlns:a16="http://schemas.microsoft.com/office/drawing/2014/main" val="20010"/>
-                    </a:ext>
-                  </a:extLst>
-                </a:gridCol>
+                <a:gridCol w="740051"/>
+                <a:gridCol w="1290785"/>
+                <a:gridCol w="860524"/>
+                <a:gridCol w="843313"/>
+                <a:gridCol w="757260"/>
+                <a:gridCol w="705629"/>
+                <a:gridCol w="1135892"/>
+                <a:gridCol w="1135892"/>
+                <a:gridCol w="826102"/>
+                <a:gridCol w="860524"/>
+                <a:gridCol w="1359627"/>
               </a:tblGrid>
               <a:tr h="0">
                 <a:tc rowSpan="2">
@@ -8336,110 +8279,35 @@
                   </a:tcPr>
                 </a:tc>
                 <a:tc hMerge="1">
-                  <a:txBody>
-                    <a:bodyPr/>
-                    <a:lstStyle/>
-                    <a:p>
-                      <a:endParaRPr lang="en-US"/>
-                    </a:p>
-                  </a:txBody>
                   <a:tcPr/>
                 </a:tc>
                 <a:tc hMerge="1">
-                  <a:txBody>
-                    <a:bodyPr/>
-                    <a:lstStyle/>
-                    <a:p>
-                      <a:endParaRPr lang="en-US"/>
-                    </a:p>
-                  </a:txBody>
                   <a:tcPr/>
                 </a:tc>
                 <a:tc hMerge="1">
-                  <a:txBody>
-                    <a:bodyPr/>
-                    <a:lstStyle/>
-                    <a:p>
-                      <a:endParaRPr lang="en-US"/>
-                    </a:p>
-                  </a:txBody>
                   <a:tcPr/>
                 </a:tc>
                 <a:tc hMerge="1">
-                  <a:txBody>
-                    <a:bodyPr/>
-                    <a:lstStyle/>
-                    <a:p>
-                      <a:endParaRPr lang="en-US"/>
-                    </a:p>
-                  </a:txBody>
                   <a:tcPr/>
                 </a:tc>
                 <a:tc hMerge="1">
-                  <a:txBody>
-                    <a:bodyPr/>
-                    <a:lstStyle/>
-                    <a:p>
-                      <a:endParaRPr lang="en-US"/>
-                    </a:p>
-                  </a:txBody>
                   <a:tcPr/>
                 </a:tc>
                 <a:tc hMerge="1">
-                  <a:txBody>
-                    <a:bodyPr/>
-                    <a:lstStyle/>
-                    <a:p>
-                      <a:endParaRPr lang="en-US"/>
-                    </a:p>
-                  </a:txBody>
                   <a:tcPr/>
                 </a:tc>
                 <a:tc hMerge="1">
-                  <a:txBody>
-                    <a:bodyPr/>
-                    <a:lstStyle/>
-                    <a:p>
-                      <a:endParaRPr lang="en-US"/>
-                    </a:p>
-                  </a:txBody>
                   <a:tcPr/>
                 </a:tc>
                 <a:tc hMerge="1">
-                  <a:txBody>
-                    <a:bodyPr/>
-                    <a:lstStyle/>
-                    <a:p>
-                      <a:endParaRPr lang="en-US"/>
-                    </a:p>
-                  </a:txBody>
                   <a:tcPr/>
                 </a:tc>
                 <a:tc hMerge="1">
-                  <a:txBody>
-                    <a:bodyPr/>
-                    <a:lstStyle/>
-                    <a:p>
-                      <a:endParaRPr lang="en-US"/>
-                    </a:p>
-                  </a:txBody>
                   <a:tcPr/>
                 </a:tc>
-                <a:extLst>
-                  <a:ext uri="{0D108BD9-81ED-4DB2-BD59-A6C34878D82A}">
-                    <a16:rowId xmlns:a16="http://schemas.microsoft.com/office/drawing/2014/main" val="10000"/>
-                  </a:ext>
-                </a:extLst>
               </a:tr>
               <a:tr h="0">
                 <a:tc vMerge="1">
-                  <a:txBody>
-                    <a:bodyPr/>
-                    <a:lstStyle/>
-                    <a:p>
-                      <a:endParaRPr lang="en-US"/>
-                    </a:p>
-                  </a:txBody>
                   <a:tcPr>
                     <a:lnL w="12700" cap="flat" cmpd="sng" algn="ctr">
                       <a:solidFill>
@@ -9099,11 +8967,6 @@
                     </a:lnB>
                   </a:tcPr>
                 </a:tc>
-                <a:extLst>
-                  <a:ext uri="{0D108BD9-81ED-4DB2-BD59-A6C34878D82A}">
-                    <a16:rowId xmlns:a16="http://schemas.microsoft.com/office/drawing/2014/main" val="10001"/>
-                  </a:ext>
-                </a:extLst>
               </a:tr>
               <a:tr h="0">
                 <a:tc>
@@ -9179,12 +9042,12 @@
                         </a:lnSpc>
                       </a:pPr>
                       <a:r>
-                        <a:rPr lang="en-US" dirty="0">
+                        <a:rPr lang="en-US" sz="2000" dirty="0">
                           <a:effectLst/>
                         </a:rPr>
                         <a:t>0.89</a:t>
                       </a:r>
-                      <a:endParaRPr lang="en-US" dirty="0">
+                      <a:endParaRPr lang="en-US" sz="2000" dirty="0">
                         <a:effectLst/>
                         <a:latin typeface="Calibri" panose="020F0502020204030204" pitchFamily="34" charset="0"/>
                         <a:cs typeface="Arial" panose="020B0604020202020204" pitchFamily="34" charset="0"/>
@@ -9244,12 +9107,12 @@
                         </a:lnSpc>
                       </a:pPr>
                       <a:r>
-                        <a:rPr lang="en-US">
+                        <a:rPr lang="en-US" sz="2000">
                           <a:effectLst/>
                         </a:rPr>
                         <a:t>0.73</a:t>
                       </a:r>
-                      <a:endParaRPr lang="en-US">
+                      <a:endParaRPr lang="en-US" sz="2000">
                         <a:effectLst/>
                         <a:latin typeface="Calibri" panose="020F0502020204030204" pitchFamily="34" charset="0"/>
                         <a:cs typeface="Arial" panose="020B0604020202020204" pitchFamily="34" charset="0"/>
@@ -9309,12 +9172,12 @@
                         </a:lnSpc>
                       </a:pPr>
                       <a:r>
-                        <a:rPr lang="en-US" dirty="0">
+                        <a:rPr lang="en-US" sz="2000" dirty="0">
                           <a:effectLst/>
                         </a:rPr>
                         <a:t>0.73</a:t>
                       </a:r>
-                      <a:endParaRPr lang="en-US" dirty="0">
+                      <a:endParaRPr lang="en-US" sz="2000" dirty="0">
                         <a:effectLst/>
                         <a:latin typeface="Calibri" panose="020F0502020204030204" pitchFamily="34" charset="0"/>
                         <a:cs typeface="Arial" panose="020B0604020202020204" pitchFamily="34" charset="0"/>
@@ -9374,12 +9237,12 @@
                         </a:lnSpc>
                       </a:pPr>
                       <a:r>
-                        <a:rPr lang="en-US" dirty="0">
+                        <a:rPr lang="en-US" sz="2000" dirty="0">
                           <a:effectLst/>
                         </a:rPr>
                         <a:t>0.89</a:t>
                       </a:r>
-                      <a:endParaRPr lang="en-US" dirty="0">
+                      <a:endParaRPr lang="en-US" sz="2000" dirty="0">
                         <a:effectLst/>
                         <a:latin typeface="Calibri" panose="020F0502020204030204" pitchFamily="34" charset="0"/>
                         <a:cs typeface="Arial" panose="020B0604020202020204" pitchFamily="34" charset="0"/>
@@ -9439,12 +9302,12 @@
                         </a:lnSpc>
                       </a:pPr>
                       <a:r>
-                        <a:rPr lang="en-US" dirty="0">
+                        <a:rPr lang="en-US" sz="2000" dirty="0">
                           <a:effectLst/>
                         </a:rPr>
                         <a:t>0.68</a:t>
                       </a:r>
-                      <a:endParaRPr lang="en-US" dirty="0">
+                      <a:endParaRPr lang="en-US" sz="2000" dirty="0">
                         <a:effectLst/>
                         <a:latin typeface="Calibri" panose="020F0502020204030204" pitchFamily="34" charset="0"/>
                         <a:cs typeface="Arial" panose="020B0604020202020204" pitchFamily="34" charset="0"/>
@@ -9504,12 +9367,12 @@
                         </a:lnSpc>
                       </a:pPr>
                       <a:r>
-                        <a:rPr lang="en-US" dirty="0">
+                        <a:rPr lang="en-US" sz="2000" dirty="0">
                           <a:effectLst/>
                         </a:rPr>
                         <a:t>0.95</a:t>
                       </a:r>
-                      <a:endParaRPr lang="en-US" dirty="0">
+                      <a:endParaRPr lang="en-US" sz="2000" dirty="0">
                         <a:effectLst/>
                         <a:latin typeface="Calibri" panose="020F0502020204030204" pitchFamily="34" charset="0"/>
                         <a:cs typeface="Arial" panose="020B0604020202020204" pitchFamily="34" charset="0"/>
@@ -9569,12 +9432,12 @@
                         </a:lnSpc>
                       </a:pPr>
                       <a:r>
-                        <a:rPr lang="en-US" dirty="0">
+                        <a:rPr lang="en-US" sz="2000" dirty="0">
                           <a:effectLst/>
                         </a:rPr>
                         <a:t>0.95</a:t>
                       </a:r>
-                      <a:endParaRPr lang="en-US" dirty="0">
+                      <a:endParaRPr lang="en-US" sz="2000" dirty="0">
                         <a:effectLst/>
                         <a:latin typeface="Calibri" panose="020F0502020204030204" pitchFamily="34" charset="0"/>
                         <a:cs typeface="Arial" panose="020B0604020202020204" pitchFamily="34" charset="0"/>
@@ -9634,12 +9497,12 @@
                         </a:lnSpc>
                       </a:pPr>
                       <a:r>
-                        <a:rPr lang="en-US" dirty="0">
+                        <a:rPr lang="en-US" sz="2000" dirty="0">
                           <a:effectLst/>
                         </a:rPr>
                         <a:t>0.73</a:t>
                       </a:r>
-                      <a:endParaRPr lang="en-US" dirty="0">
+                      <a:endParaRPr lang="en-US" sz="2000" dirty="0">
                         <a:effectLst/>
                         <a:latin typeface="Calibri" panose="020F0502020204030204" pitchFamily="34" charset="0"/>
                         <a:cs typeface="Arial" panose="020B0604020202020204" pitchFamily="34" charset="0"/>
@@ -9699,12 +9562,12 @@
                         </a:lnSpc>
                       </a:pPr>
                       <a:r>
-                        <a:rPr lang="en-US" dirty="0">
+                        <a:rPr lang="en-US" sz="2000" dirty="0">
                           <a:effectLst/>
                         </a:rPr>
                         <a:t>0.16</a:t>
                       </a:r>
-                      <a:endParaRPr lang="en-US" dirty="0">
+                      <a:endParaRPr lang="en-US" sz="2000" dirty="0">
                         <a:effectLst/>
                         <a:latin typeface="Calibri" panose="020F0502020204030204" pitchFamily="34" charset="0"/>
                         <a:cs typeface="Arial" panose="020B0604020202020204" pitchFamily="34" charset="0"/>
@@ -9764,12 +9627,12 @@
                         </a:lnSpc>
                       </a:pPr>
                       <a:r>
-                        <a:rPr lang="en-US" dirty="0">
+                        <a:rPr lang="en-US" sz="2000" dirty="0">
                           <a:effectLst/>
                         </a:rPr>
                         <a:t>0.62</a:t>
                       </a:r>
-                      <a:endParaRPr lang="en-US" dirty="0">
+                      <a:endParaRPr lang="en-US" sz="2000" dirty="0">
                         <a:effectLst/>
                         <a:latin typeface="Calibri" panose="020F0502020204030204" pitchFamily="34" charset="0"/>
                         <a:cs typeface="Arial" panose="020B0604020202020204" pitchFamily="34" charset="0"/>
@@ -9818,11 +9681,6 @@
                     </a:solidFill>
                   </a:tcPr>
                 </a:tc>
-                <a:extLst>
-                  <a:ext uri="{0D108BD9-81ED-4DB2-BD59-A6C34878D82A}">
-                    <a16:rowId xmlns:a16="http://schemas.microsoft.com/office/drawing/2014/main" val="10002"/>
-                  </a:ext>
-                </a:extLst>
               </a:tr>
             </a:tbl>
           </a:graphicData>
@@ -9833,13 +9691,13 @@
   <p:clrMapOvr>
     <a:masterClrMapping/>
   </p:clrMapOvr>
-  <mc:AlternateContent xmlns:mc="http://schemas.openxmlformats.org/markup-compatibility/2006" xmlns:p14="http://schemas.microsoft.com/office/powerpoint/2010/main">
-    <mc:Choice Requires="p14">
+  <mc:AlternateContent xmlns:mc="http://schemas.openxmlformats.org/markup-compatibility/2006">
+    <mc:Choice xmlns:p14="http://schemas.microsoft.com/office/powerpoint/2010/main" Requires="p14">
       <p:transition spd="med" p14:dur="700">
         <p:fade/>
       </p:transition>
     </mc:Choice>
-    <mc:Fallback xmlns="">
+    <mc:Fallback>
       <p:transition spd="med">
         <p:fade/>
       </p:transition>
@@ -10057,17 +9915,11 @@
           <p:cNvGraphicFramePr>
             <a:graphicFrameLocks noGrp="1"/>
           </p:cNvGraphicFramePr>
-          <p:nvPr>
-            <p:extLst>
-              <p:ext uri="{D42A27DB-BD31-4B8C-83A1-F6EECF244321}">
-                <p14:modId xmlns:p14="http://schemas.microsoft.com/office/powerpoint/2010/main" val="1850753237"/>
-              </p:ext>
-            </p:extLst>
-          </p:nvPr>
+          <p:nvPr/>
         </p:nvGraphicFramePr>
         <p:xfrm>
-          <a:off x="838200" y="1502429"/>
-          <a:ext cx="11020720" cy="3636226"/>
+          <a:off x="838200" y="1275734"/>
+          <a:ext cx="11020425" cy="3793490"/>
         </p:xfrm>
         <a:graphic>
           <a:graphicData uri="http://schemas.openxmlformats.org/drawingml/2006/table">
@@ -10076,34 +9928,10 @@
                 <a:tableStyleId>{7DF18680-E054-41AD-8BC1-D1AEF772440D}</a:tableStyleId>
               </a:tblPr>
               <a:tblGrid>
-                <a:gridCol w="2236878">
-                  <a:extLst>
-                    <a:ext uri="{9D8B030D-6E8A-4147-A177-3AD203B41FA5}">
-                      <a16:colId xmlns:a16="http://schemas.microsoft.com/office/drawing/2014/main" val="20000"/>
-                    </a:ext>
-                  </a:extLst>
-                </a:gridCol>
-                <a:gridCol w="2236878">
-                  <a:extLst>
-                    <a:ext uri="{9D8B030D-6E8A-4147-A177-3AD203B41FA5}">
-                      <a16:colId xmlns:a16="http://schemas.microsoft.com/office/drawing/2014/main" val="20001"/>
-                    </a:ext>
-                  </a:extLst>
-                </a:gridCol>
-                <a:gridCol w="2764274">
-                  <a:extLst>
-                    <a:ext uri="{9D8B030D-6E8A-4147-A177-3AD203B41FA5}">
-                      <a16:colId xmlns:a16="http://schemas.microsoft.com/office/drawing/2014/main" val="20002"/>
-                    </a:ext>
-                  </a:extLst>
-                </a:gridCol>
-                <a:gridCol w="3782690">
-                  <a:extLst>
-                    <a:ext uri="{9D8B030D-6E8A-4147-A177-3AD203B41FA5}">
-                      <a16:colId xmlns:a16="http://schemas.microsoft.com/office/drawing/2014/main" val="20003"/>
-                    </a:ext>
-                  </a:extLst>
-                </a:gridCol>
+                <a:gridCol w="2236878"/>
+                <a:gridCol w="2236878"/>
+                <a:gridCol w="2764274"/>
+                <a:gridCol w="3782690"/>
               </a:tblGrid>
               <a:tr h="212969">
                 <a:tc rowSpan="2">
@@ -10122,6 +9950,9 @@
                         </a:rPr>
                         <a:t>Metrik</a:t>
                       </a:r>
+                      <a:endParaRPr lang="en-US" sz="1500" b="1" dirty="0" err="1">
+                        <a:effectLst/>
+                      </a:endParaRPr>
                     </a:p>
                     <a:p>
                       <a:pPr algn="ctr">
@@ -10244,40 +10075,14 @@
                   </a:tcPr>
                 </a:tc>
                 <a:tc hMerge="1">
-                  <a:txBody>
-                    <a:bodyPr/>
-                    <a:lstStyle/>
-                    <a:p>
-                      <a:endParaRPr lang="en-US"/>
-                    </a:p>
-                  </a:txBody>
                   <a:tcPr/>
                 </a:tc>
                 <a:tc hMerge="1">
-                  <a:txBody>
-                    <a:bodyPr/>
-                    <a:lstStyle/>
-                    <a:p>
-                      <a:endParaRPr lang="en-US"/>
-                    </a:p>
-                  </a:txBody>
                   <a:tcPr/>
                 </a:tc>
-                <a:extLst>
-                  <a:ext uri="{0D108BD9-81ED-4DB2-BD59-A6C34878D82A}">
-                    <a16:rowId xmlns:a16="http://schemas.microsoft.com/office/drawing/2014/main" val="10000"/>
-                  </a:ext>
-                </a:extLst>
               </a:tr>
               <a:tr h="594881">
                 <a:tc vMerge="1">
-                  <a:txBody>
-                    <a:bodyPr/>
-                    <a:lstStyle/>
-                    <a:p>
-                      <a:endParaRPr lang="en-US"/>
-                    </a:p>
-                  </a:txBody>
                   <a:tcPr marL="77624" marR="77624" marT="38812" marB="38812"/>
                 </a:tc>
                 <a:tc>
@@ -10358,6 +10163,9 @@
                         </a:rPr>
                         <a:t>VGG16</a:t>
                       </a:r>
+                      <a:endParaRPr lang="en-US" sz="1500" b="1" dirty="0">
+                        <a:effectLst/>
+                      </a:endParaRPr>
                     </a:p>
                     <a:p>
                       <a:pPr algn="ctr">
@@ -10433,6 +10241,9 @@
                         </a:rPr>
                         <a:t>VGG16</a:t>
                       </a:r>
+                      <a:endParaRPr lang="en-US" sz="1500" b="1" dirty="0">
+                        <a:effectLst/>
+                      </a:endParaRPr>
                     </a:p>
                     <a:p>
                       <a:pPr algn="ctr">
@@ -10492,11 +10303,6 @@
                     </a:lnB>
                   </a:tcPr>
                 </a:tc>
-                <a:extLst>
-                  <a:ext uri="{0D108BD9-81ED-4DB2-BD59-A6C34878D82A}">
-                    <a16:rowId xmlns:a16="http://schemas.microsoft.com/office/drawing/2014/main" val="10001"/>
-                  </a:ext>
-                </a:extLst>
               </a:tr>
               <a:tr h="233391">
                 <a:tc>
@@ -10510,12 +10316,12 @@
                         </a:lnSpc>
                       </a:pPr>
                       <a:r>
-                        <a:rPr lang="en-US" sz="1500" dirty="0">
+                        <a:rPr lang="en-US" sz="1500" b="1" dirty="0">
                           <a:effectLst/>
                         </a:rPr>
                         <a:t>Accuracy</a:t>
                       </a:r>
-                      <a:endParaRPr lang="en-US" sz="1500" dirty="0">
+                      <a:endParaRPr lang="en-US" sz="1500" b="1" dirty="0">
                         <a:effectLst/>
                         <a:latin typeface="Calibri" panose="020F0502020204030204" pitchFamily="34" charset="0"/>
                         <a:cs typeface="Arial" panose="020B0604020202020204" pitchFamily="34" charset="0"/>
@@ -10572,12 +10378,12 @@
                         </a:lnSpc>
                       </a:pPr>
                       <a:r>
-                        <a:rPr lang="en-US" sz="1500" b="0" dirty="0">
+                        <a:rPr lang="en-US" sz="1800" b="0" dirty="0">
                           <a:effectLst/>
                         </a:rPr>
                         <a:t>0.89</a:t>
                       </a:r>
-                      <a:endParaRPr lang="en-US" sz="1500" b="0" dirty="0">
+                      <a:endParaRPr lang="en-US" sz="1800" b="0" dirty="0">
                         <a:effectLst/>
                         <a:latin typeface="Calibri" panose="020F0502020204030204" pitchFamily="34" charset="0"/>
                         <a:cs typeface="Arial" panose="020B0604020202020204" pitchFamily="34" charset="0"/>
@@ -10637,12 +10443,12 @@
                         </a:lnSpc>
                       </a:pPr>
                       <a:r>
-                        <a:rPr lang="en-US" sz="1500" dirty="0">
+                        <a:rPr lang="en-US" sz="1800" dirty="0">
                           <a:effectLst/>
                         </a:rPr>
                         <a:t>0.88</a:t>
                       </a:r>
-                      <a:endParaRPr lang="en-US" sz="1500" dirty="0">
+                      <a:endParaRPr lang="en-US" sz="1800" dirty="0">
                         <a:effectLst/>
                         <a:latin typeface="Calibri" panose="020F0502020204030204" pitchFamily="34" charset="0"/>
                         <a:cs typeface="Arial" panose="020B0604020202020204" pitchFamily="34" charset="0"/>
@@ -10702,12 +10508,12 @@
                         </a:lnSpc>
                       </a:pPr>
                       <a:r>
-                        <a:rPr lang="en-US" sz="1500">
+                        <a:rPr lang="en-US" sz="1800">
                           <a:effectLst/>
                         </a:rPr>
                         <a:t>0.89</a:t>
                       </a:r>
-                      <a:endParaRPr lang="en-US" sz="1500">
+                      <a:endParaRPr lang="en-US" sz="1800">
                         <a:effectLst/>
                         <a:latin typeface="Calibri" panose="020F0502020204030204" pitchFamily="34" charset="0"/>
                         <a:cs typeface="Arial" panose="020B0604020202020204" pitchFamily="34" charset="0"/>
@@ -10756,11 +10562,6 @@
                     </a:solidFill>
                   </a:tcPr>
                 </a:tc>
-                <a:extLst>
-                  <a:ext uri="{0D108BD9-81ED-4DB2-BD59-A6C34878D82A}">
-                    <a16:rowId xmlns:a16="http://schemas.microsoft.com/office/drawing/2014/main" val="10002"/>
-                  </a:ext>
-                </a:extLst>
               </a:tr>
               <a:tr h="233391">
                 <a:tc>
@@ -10774,12 +10575,12 @@
                         </a:lnSpc>
                       </a:pPr>
                       <a:r>
-                        <a:rPr lang="en-US" sz="1600" dirty="0">
+                        <a:rPr lang="en-US" sz="1600" b="1" dirty="0">
                           <a:effectLst/>
                         </a:rPr>
                         <a:t>Specificity</a:t>
                       </a:r>
-                      <a:endParaRPr lang="en-US" sz="1500" dirty="0">
+                      <a:endParaRPr lang="en-US" sz="1600" b="1" dirty="0">
                         <a:effectLst/>
                         <a:latin typeface="Calibri" panose="020F0502020204030204" pitchFamily="34" charset="0"/>
                         <a:cs typeface="Arial" panose="020B0604020202020204" pitchFamily="34" charset="0"/>
@@ -10836,12 +10637,12 @@
                         </a:lnSpc>
                       </a:pPr>
                       <a:r>
-                        <a:rPr lang="en-US" sz="1500" b="0" dirty="0">
+                        <a:rPr lang="en-US" sz="1800" b="0" dirty="0">
                           <a:effectLst/>
                         </a:rPr>
                         <a:t>0.95</a:t>
                       </a:r>
-                      <a:endParaRPr lang="en-US" sz="1500" b="0" dirty="0">
+                      <a:endParaRPr lang="en-US" sz="1800" b="0" dirty="0">
                         <a:effectLst/>
                         <a:latin typeface="Calibri" panose="020F0502020204030204" pitchFamily="34" charset="0"/>
                         <a:cs typeface="Arial" panose="020B0604020202020204" pitchFamily="34" charset="0"/>
@@ -10901,15 +10702,13 @@
                         </a:lnSpc>
                       </a:pPr>
                       <a:r>
-                        <a:rPr lang="en-US" sz="1500" dirty="0">
+                        <a:rPr lang="en-US" sz="1800" dirty="0">
                           <a:effectLst/>
                         </a:rPr>
-                        <a:t>0.71</a:t>
+                        <a:t>0.96</a:t>
                       </a:r>
-                      <a:endParaRPr lang="en-US" sz="1500" dirty="0">
+                      <a:endParaRPr lang="en-US" sz="1800" dirty="0">
                         <a:effectLst/>
-                        <a:latin typeface="Calibri" panose="020F0502020204030204" pitchFamily="34" charset="0"/>
-                        <a:cs typeface="Arial" panose="020B0604020202020204" pitchFamily="34" charset="0"/>
                       </a:endParaRPr>
                     </a:p>
                   </a:txBody>
@@ -10966,15 +10765,13 @@
                         </a:lnSpc>
                       </a:pPr>
                       <a:r>
-                        <a:rPr lang="en-US" sz="1500">
+                        <a:rPr lang="en-US" sz="1800">
                           <a:effectLst/>
                         </a:rPr>
-                        <a:t>0.73</a:t>
+                        <a:t>0.95</a:t>
                       </a:r>
-                      <a:endParaRPr lang="en-US" sz="1500">
+                      <a:endParaRPr lang="en-US" sz="1800">
                         <a:effectLst/>
-                        <a:latin typeface="Calibri" panose="020F0502020204030204" pitchFamily="34" charset="0"/>
-                        <a:cs typeface="Arial" panose="020B0604020202020204" pitchFamily="34" charset="0"/>
                       </a:endParaRPr>
                     </a:p>
                   </a:txBody>
@@ -11020,13 +10817,8 @@
                     </a:solidFill>
                   </a:tcPr>
                 </a:tc>
-                <a:extLst>
-                  <a:ext uri="{0D108BD9-81ED-4DB2-BD59-A6C34878D82A}">
-                    <a16:rowId xmlns:a16="http://schemas.microsoft.com/office/drawing/2014/main" val="10003"/>
-                  </a:ext>
-                </a:extLst>
               </a:tr>
-              <a:tr h="233391">
+              <a:tr h="443230">
                 <a:tc>
                   <a:txBody>
                     <a:bodyPr/>
@@ -11038,12 +10830,12 @@
                         </a:lnSpc>
                       </a:pPr>
                       <a:r>
-                        <a:rPr lang="en-US" sz="1600" dirty="0">
+                        <a:rPr lang="en-US" sz="1600" b="1" dirty="0">
                           <a:effectLst/>
                         </a:rPr>
                         <a:t>Sensitivity</a:t>
                       </a:r>
-                      <a:endParaRPr lang="en-US" sz="1500" dirty="0">
+                      <a:endParaRPr lang="en-US" sz="1600" b="1" dirty="0">
                         <a:effectLst/>
                         <a:latin typeface="Calibri" panose="020F0502020204030204" pitchFamily="34" charset="0"/>
                         <a:cs typeface="Arial" panose="020B0604020202020204" pitchFamily="34" charset="0"/>
@@ -11100,12 +10892,12 @@
                         </a:lnSpc>
                       </a:pPr>
                       <a:r>
-                        <a:rPr lang="en-US" sz="1500" b="0" dirty="0">
+                        <a:rPr lang="en-US" sz="1800" b="0" dirty="0">
                           <a:effectLst/>
                         </a:rPr>
                         <a:t>0.95</a:t>
                       </a:r>
-                      <a:endParaRPr lang="en-US" sz="1500" b="0" dirty="0">
+                      <a:endParaRPr lang="en-US" sz="1800" b="0" dirty="0">
                         <a:effectLst/>
                         <a:latin typeface="Calibri" panose="020F0502020204030204" pitchFamily="34" charset="0"/>
                         <a:cs typeface="Arial" panose="020B0604020202020204" pitchFamily="34" charset="0"/>
@@ -11165,15 +10957,13 @@
                         </a:lnSpc>
                       </a:pPr>
                       <a:r>
-                        <a:rPr lang="en-US" sz="1500">
+                        <a:rPr lang="en-US" sz="1800">
                           <a:effectLst/>
                         </a:rPr>
-                        <a:t>0.71</a:t>
+                        <a:t>0.80</a:t>
                       </a:r>
-                      <a:endParaRPr lang="en-US" sz="1500">
+                      <a:endParaRPr lang="en-US" sz="1800">
                         <a:effectLst/>
-                        <a:latin typeface="Calibri" panose="020F0502020204030204" pitchFamily="34" charset="0"/>
-                        <a:cs typeface="Arial" panose="020B0604020202020204" pitchFamily="34" charset="0"/>
                       </a:endParaRPr>
                     </a:p>
                   </a:txBody>
@@ -11230,15 +11020,13 @@
                         </a:lnSpc>
                       </a:pPr>
                       <a:r>
-                        <a:rPr lang="en-US" sz="1500" dirty="0">
+                        <a:rPr lang="en-US" sz="1800" dirty="0">
                           <a:effectLst/>
                         </a:rPr>
-                        <a:t>0.73</a:t>
+                        <a:t>0.95</a:t>
                       </a:r>
-                      <a:endParaRPr lang="en-US" sz="1500" dirty="0">
+                      <a:endParaRPr lang="en-US" sz="1800" dirty="0">
                         <a:effectLst/>
-                        <a:latin typeface="Calibri" panose="020F0502020204030204" pitchFamily="34" charset="0"/>
-                        <a:cs typeface="Arial" panose="020B0604020202020204" pitchFamily="34" charset="0"/>
                       </a:endParaRPr>
                     </a:p>
                   </a:txBody>
@@ -11284,11 +11072,6 @@
                     </a:solidFill>
                   </a:tcPr>
                 </a:tc>
-                <a:extLst>
-                  <a:ext uri="{0D108BD9-81ED-4DB2-BD59-A6C34878D82A}">
-                    <a16:rowId xmlns:a16="http://schemas.microsoft.com/office/drawing/2014/main" val="10004"/>
-                  </a:ext>
-                </a:extLst>
               </a:tr>
               <a:tr h="233391">
                 <a:tc>
@@ -11302,12 +11085,12 @@
                         </a:lnSpc>
                       </a:pPr>
                       <a:r>
-                        <a:rPr lang="en-US" sz="1600" dirty="0">
+                        <a:rPr lang="en-US" sz="1600" b="1" dirty="0">
                           <a:effectLst/>
                         </a:rPr>
                         <a:t>Precision</a:t>
                       </a:r>
-                      <a:endParaRPr lang="en-US" sz="1500" dirty="0">
+                      <a:endParaRPr lang="en-US" sz="1600" b="1" dirty="0">
                         <a:effectLst/>
                         <a:latin typeface="Calibri" panose="020F0502020204030204" pitchFamily="34" charset="0"/>
                         <a:cs typeface="Arial" panose="020B0604020202020204" pitchFamily="34" charset="0"/>
@@ -11364,15 +11147,13 @@
                         </a:lnSpc>
                       </a:pPr>
                       <a:r>
-                        <a:rPr lang="en-US" sz="1500" b="0" dirty="0">
+                        <a:rPr lang="en-US" sz="1800" b="0" dirty="0">
                           <a:effectLst/>
                         </a:rPr>
-                        <a:t>0.89</a:t>
+                        <a:t>0.73</a:t>
                       </a:r>
-                      <a:endParaRPr lang="en-US" sz="1500" b="0" dirty="0">
+                      <a:endParaRPr lang="en-US" sz="1800" b="0" dirty="0">
                         <a:effectLst/>
-                        <a:latin typeface="Calibri" panose="020F0502020204030204" pitchFamily="34" charset="0"/>
-                        <a:cs typeface="Arial" panose="020B0604020202020204" pitchFamily="34" charset="0"/>
                       </a:endParaRPr>
                     </a:p>
                   </a:txBody>
@@ -11429,15 +11210,13 @@
                         </a:lnSpc>
                       </a:pPr>
                       <a:r>
-                        <a:rPr lang="en-US" sz="1500">
+                        <a:rPr lang="en-US" sz="1800">
                           <a:effectLst/>
                         </a:rPr>
-                        <a:t>0.85</a:t>
+                        <a:t>0.71</a:t>
                       </a:r>
-                      <a:endParaRPr lang="en-US" sz="1500">
+                      <a:endParaRPr lang="en-US" sz="1800">
                         <a:effectLst/>
-                        <a:latin typeface="Calibri" panose="020F0502020204030204" pitchFamily="34" charset="0"/>
-                        <a:cs typeface="Arial" panose="020B0604020202020204" pitchFamily="34" charset="0"/>
                       </a:endParaRPr>
                     </a:p>
                   </a:txBody>
@@ -11494,15 +11273,13 @@
                         </a:lnSpc>
                       </a:pPr>
                       <a:r>
-                        <a:rPr lang="en-US" sz="1500" dirty="0">
+                        <a:rPr lang="en-US" sz="1800" dirty="0">
                           <a:effectLst/>
                         </a:rPr>
-                        <a:t>0.89</a:t>
+                        <a:t>0.73</a:t>
                       </a:r>
-                      <a:endParaRPr lang="en-US" sz="1500" dirty="0">
+                      <a:endParaRPr lang="en-US" sz="1800" dirty="0">
                         <a:effectLst/>
-                        <a:latin typeface="Calibri" panose="020F0502020204030204" pitchFamily="34" charset="0"/>
-                        <a:cs typeface="Arial" panose="020B0604020202020204" pitchFamily="34" charset="0"/>
                       </a:endParaRPr>
                     </a:p>
                   </a:txBody>
@@ -11548,13 +11325,8 @@
                     </a:solidFill>
                   </a:tcPr>
                 </a:tc>
-                <a:extLst>
-                  <a:ext uri="{0D108BD9-81ED-4DB2-BD59-A6C34878D82A}">
-                    <a16:rowId xmlns:a16="http://schemas.microsoft.com/office/drawing/2014/main" val="10005"/>
-                  </a:ext>
-                </a:extLst>
               </a:tr>
-              <a:tr h="233391">
+              <a:tr h="439420">
                 <a:tc>
                   <a:txBody>
                     <a:bodyPr/>
@@ -11566,12 +11338,12 @@
                         </a:lnSpc>
                       </a:pPr>
                       <a:r>
-                        <a:rPr lang="en-US" sz="1500" dirty="0">
+                        <a:rPr lang="en-US" sz="1500" b="1" dirty="0">
                           <a:effectLst/>
                         </a:rPr>
                         <a:t>AUC</a:t>
                       </a:r>
-                      <a:endParaRPr lang="en-US" sz="1500" dirty="0">
+                      <a:endParaRPr lang="en-US" sz="1500" b="1" dirty="0">
                         <a:effectLst/>
                         <a:latin typeface="Calibri" panose="020F0502020204030204" pitchFamily="34" charset="0"/>
                         <a:cs typeface="Arial" panose="020B0604020202020204" pitchFamily="34" charset="0"/>
@@ -11628,15 +11400,13 @@
                         </a:lnSpc>
                       </a:pPr>
                       <a:r>
-                        <a:rPr lang="en-US" sz="1500" b="0" dirty="0">
+                        <a:rPr lang="en-US" sz="1800" b="0" dirty="0">
                           <a:effectLst/>
                         </a:rPr>
-                        <a:t>0.68</a:t>
+                        <a:t>0.89</a:t>
                       </a:r>
-                      <a:endParaRPr lang="en-US" sz="1500" b="0" dirty="0">
+                      <a:endParaRPr lang="en-US" sz="1800" b="0" dirty="0">
                         <a:effectLst/>
-                        <a:latin typeface="Calibri" panose="020F0502020204030204" pitchFamily="34" charset="0"/>
-                        <a:cs typeface="Arial" panose="020B0604020202020204" pitchFamily="34" charset="0"/>
                       </a:endParaRPr>
                     </a:p>
                   </a:txBody>
@@ -11693,15 +11463,13 @@
                         </a:lnSpc>
                       </a:pPr>
                       <a:r>
-                        <a:rPr lang="en-US" sz="1500">
+                        <a:rPr lang="en-US" sz="1800">
                           <a:effectLst/>
                         </a:rPr>
-                        <a:t>0.66</a:t>
+                        <a:t>0.85</a:t>
                       </a:r>
-                      <a:endParaRPr lang="en-US" sz="1500">
+                      <a:endParaRPr lang="en-US" sz="1800">
                         <a:effectLst/>
-                        <a:latin typeface="Calibri" panose="020F0502020204030204" pitchFamily="34" charset="0"/>
-                        <a:cs typeface="Arial" panose="020B0604020202020204" pitchFamily="34" charset="0"/>
                       </a:endParaRPr>
                     </a:p>
                   </a:txBody>
@@ -11758,15 +11526,13 @@
                         </a:lnSpc>
                       </a:pPr>
                       <a:r>
-                        <a:rPr lang="en-US" sz="1500" dirty="0">
+                        <a:rPr lang="en-US" sz="1800" dirty="0">
                           <a:effectLst/>
                         </a:rPr>
-                        <a:t>0.68</a:t>
+                        <a:t>0.89</a:t>
                       </a:r>
-                      <a:endParaRPr lang="en-US" sz="1500" dirty="0">
+                      <a:endParaRPr lang="en-US" sz="1800" dirty="0">
                         <a:effectLst/>
-                        <a:latin typeface="Calibri" panose="020F0502020204030204" pitchFamily="34" charset="0"/>
-                        <a:cs typeface="Arial" panose="020B0604020202020204" pitchFamily="34" charset="0"/>
                       </a:endParaRPr>
                     </a:p>
                   </a:txBody>
@@ -11812,11 +11578,6 @@
                     </a:solidFill>
                   </a:tcPr>
                 </a:tc>
-                <a:extLst>
-                  <a:ext uri="{0D108BD9-81ED-4DB2-BD59-A6C34878D82A}">
-                    <a16:rowId xmlns:a16="http://schemas.microsoft.com/office/drawing/2014/main" val="10006"/>
-                  </a:ext>
-                </a:extLst>
               </a:tr>
               <a:tr h="403925">
                 <a:tc>
@@ -11830,12 +11591,12 @@
                         </a:lnSpc>
                       </a:pPr>
                       <a:r>
-                        <a:rPr lang="en-US" sz="1500" dirty="0">
+                        <a:rPr lang="en-US" sz="1500" b="1" dirty="0">
                           <a:effectLst/>
                         </a:rPr>
                         <a:t>PRC</a:t>
                       </a:r>
-                      <a:endParaRPr lang="en-US" sz="1500" dirty="0">
+                      <a:endParaRPr lang="en-US" sz="1500" b="1" dirty="0">
                         <a:effectLst/>
                         <a:latin typeface="Calibri" panose="020F0502020204030204" pitchFamily="34" charset="0"/>
                         <a:cs typeface="Arial" panose="020B0604020202020204" pitchFamily="34" charset="0"/>
@@ -11892,15 +11653,13 @@
                         </a:lnSpc>
                       </a:pPr>
                       <a:r>
-                        <a:rPr lang="en-US" sz="1500" b="0" dirty="0">
+                        <a:rPr lang="en-US" sz="1800" b="0" dirty="0">
                           <a:effectLst/>
                         </a:rPr>
-                        <a:t>0.95</a:t>
+                        <a:t>0.68</a:t>
                       </a:r>
-                      <a:endParaRPr lang="en-US" sz="1500" b="0" dirty="0">
+                      <a:endParaRPr lang="en-US" sz="1800" b="0" dirty="0">
                         <a:effectLst/>
-                        <a:latin typeface="Calibri" panose="020F0502020204030204" pitchFamily="34" charset="0"/>
-                        <a:cs typeface="Arial" panose="020B0604020202020204" pitchFamily="34" charset="0"/>
                       </a:endParaRPr>
                     </a:p>
                   </a:txBody>
@@ -11957,15 +11716,13 @@
                         </a:lnSpc>
                       </a:pPr>
                       <a:r>
-                        <a:rPr lang="en-US" sz="1500" dirty="0">
+                        <a:rPr lang="en-US" sz="1800" dirty="0">
                           <a:effectLst/>
                         </a:rPr>
-                        <a:t>0.96</a:t>
+                        <a:t>0.66</a:t>
                       </a:r>
-                      <a:endParaRPr lang="en-US" sz="1500" dirty="0">
+                      <a:endParaRPr lang="en-US" sz="1800" dirty="0">
                         <a:effectLst/>
-                        <a:latin typeface="Calibri" panose="020F0502020204030204" pitchFamily="34" charset="0"/>
-                        <a:cs typeface="Arial" panose="020B0604020202020204" pitchFamily="34" charset="0"/>
                       </a:endParaRPr>
                     </a:p>
                   </a:txBody>
@@ -12022,15 +11779,13 @@
                         </a:lnSpc>
                       </a:pPr>
                       <a:r>
-                        <a:rPr lang="en-US" sz="1500" dirty="0">
+                        <a:rPr lang="en-US" sz="1800" dirty="0">
                           <a:effectLst/>
                         </a:rPr>
-                        <a:t>0.95</a:t>
+                        <a:t>0.68</a:t>
                       </a:r>
-                      <a:endParaRPr lang="en-US" sz="1500" dirty="0">
+                      <a:endParaRPr lang="en-US" sz="1800" dirty="0">
                         <a:effectLst/>
-                        <a:latin typeface="Calibri" panose="020F0502020204030204" pitchFamily="34" charset="0"/>
-                        <a:cs typeface="Arial" panose="020B0604020202020204" pitchFamily="34" charset="0"/>
                       </a:endParaRPr>
                     </a:p>
                   </a:txBody>
@@ -12076,11 +11831,6 @@
                     </a:solidFill>
                   </a:tcPr>
                 </a:tc>
-                <a:extLst>
-                  <a:ext uri="{0D108BD9-81ED-4DB2-BD59-A6C34878D82A}">
-                    <a16:rowId xmlns:a16="http://schemas.microsoft.com/office/drawing/2014/main" val="10007"/>
-                  </a:ext>
-                </a:extLst>
               </a:tr>
             </a:tbl>
           </a:graphicData>
@@ -12306,6 +12056,7 @@
               <a:rPr lang="en-ID" dirty="0"/>
               <a:t> VGG16 Transfer Learning dan Fine Tuning</a:t>
             </a:r>
+            <a:endParaRPr lang="en-ID" dirty="0"/>
           </a:p>
         </p:txBody>
       </p:sp>
@@ -12314,13 +12065,13 @@
   <p:clrMapOvr>
     <a:masterClrMapping/>
   </p:clrMapOvr>
-  <mc:AlternateContent xmlns:mc="http://schemas.openxmlformats.org/markup-compatibility/2006" xmlns:p14="http://schemas.microsoft.com/office/powerpoint/2010/main">
-    <mc:Choice Requires="p14">
+  <mc:AlternateContent xmlns:mc="http://schemas.openxmlformats.org/markup-compatibility/2006">
+    <mc:Choice xmlns:p14="http://schemas.microsoft.com/office/powerpoint/2010/main" Requires="p14">
       <p:transition spd="med" p14:dur="700">
         <p:fade/>
       </p:transition>
     </mc:Choice>
-    <mc:Fallback xmlns="">
+    <mc:Fallback>
       <p:transition spd="med">
         <p:fade/>
       </p:transition>
@@ -12538,13 +12289,7 @@
           <p:cNvGraphicFramePr>
             <a:graphicFrameLocks noGrp="1"/>
           </p:cNvGraphicFramePr>
-          <p:nvPr>
-            <p:extLst>
-              <p:ext uri="{D42A27DB-BD31-4B8C-83A1-F6EECF244321}">
-                <p14:modId xmlns:p14="http://schemas.microsoft.com/office/powerpoint/2010/main" val="2323544618"/>
-              </p:ext>
-            </p:extLst>
-          </p:nvPr>
+          <p:nvPr/>
         </p:nvGraphicFramePr>
         <p:xfrm>
           <a:off x="838201" y="1429699"/>
@@ -12557,41 +12302,11 @@
                 <a:tableStyleId>{5C22544A-7EE6-4342-B048-85BDC9FD1C3A}</a:tableStyleId>
               </a:tblPr>
               <a:tblGrid>
-                <a:gridCol w="2147583">
-                  <a:extLst>
-                    <a:ext uri="{9D8B030D-6E8A-4147-A177-3AD203B41FA5}">
-                      <a16:colId xmlns:a16="http://schemas.microsoft.com/office/drawing/2014/main" val="20000"/>
-                    </a:ext>
-                  </a:extLst>
-                </a:gridCol>
-                <a:gridCol w="2147583">
-                  <a:extLst>
-                    <a:ext uri="{9D8B030D-6E8A-4147-A177-3AD203B41FA5}">
-                      <a16:colId xmlns:a16="http://schemas.microsoft.com/office/drawing/2014/main" val="20001"/>
-                    </a:ext>
-                  </a:extLst>
-                </a:gridCol>
-                <a:gridCol w="2147583">
-                  <a:extLst>
-                    <a:ext uri="{9D8B030D-6E8A-4147-A177-3AD203B41FA5}">
-                      <a16:colId xmlns:a16="http://schemas.microsoft.com/office/drawing/2014/main" val="20002"/>
-                    </a:ext>
-                  </a:extLst>
-                </a:gridCol>
-                <a:gridCol w="2147583">
-                  <a:extLst>
-                    <a:ext uri="{9D8B030D-6E8A-4147-A177-3AD203B41FA5}">
-                      <a16:colId xmlns:a16="http://schemas.microsoft.com/office/drawing/2014/main" val="20003"/>
-                    </a:ext>
-                  </a:extLst>
-                </a:gridCol>
-                <a:gridCol w="2147583">
-                  <a:extLst>
-                    <a:ext uri="{9D8B030D-6E8A-4147-A177-3AD203B41FA5}">
-                      <a16:colId xmlns:a16="http://schemas.microsoft.com/office/drawing/2014/main" val="20004"/>
-                    </a:ext>
-                  </a:extLst>
-                </a:gridCol>
+                <a:gridCol w="2147583"/>
+                <a:gridCol w="2147583"/>
+                <a:gridCol w="2147583"/>
+                <a:gridCol w="2147583"/>
+                <a:gridCol w="2147583"/>
               </a:tblGrid>
               <a:tr h="235194">
                 <a:tc rowSpan="2">
@@ -12717,50 +12432,17 @@
                   </a:tcPr>
                 </a:tc>
                 <a:tc hMerge="1">
-                  <a:txBody>
-                    <a:bodyPr/>
-                    <a:lstStyle/>
-                    <a:p>
-                      <a:endParaRPr lang="en-US"/>
-                    </a:p>
-                  </a:txBody>
                   <a:tcPr/>
                 </a:tc>
                 <a:tc hMerge="1">
-                  <a:txBody>
-                    <a:bodyPr/>
-                    <a:lstStyle/>
-                    <a:p>
-                      <a:endParaRPr lang="en-US"/>
-                    </a:p>
-                  </a:txBody>
                   <a:tcPr/>
                 </a:tc>
                 <a:tc hMerge="1">
-                  <a:txBody>
-                    <a:bodyPr/>
-                    <a:lstStyle/>
-                    <a:p>
-                      <a:endParaRPr lang="en-US"/>
-                    </a:p>
-                  </a:txBody>
                   <a:tcPr/>
                 </a:tc>
-                <a:extLst>
-                  <a:ext uri="{0D108BD9-81ED-4DB2-BD59-A6C34878D82A}">
-                    <a16:rowId xmlns:a16="http://schemas.microsoft.com/office/drawing/2014/main" val="10000"/>
-                  </a:ext>
-                </a:extLst>
               </a:tr>
               <a:tr h="446077">
                 <a:tc vMerge="1">
-                  <a:txBody>
-                    <a:bodyPr/>
-                    <a:lstStyle/>
-                    <a:p>
-                      <a:endParaRPr lang="en-US"/>
-                    </a:p>
-                  </a:txBody>
                   <a:tcPr marL="88532" marR="88532" marT="44266" marB="44266">
                     <a:lnL w="12700" cap="flat" cmpd="sng" algn="ctr">
                       <a:solidFill>
@@ -13048,11 +12730,6 @@
                     </a:lnB>
                   </a:tcPr>
                 </a:tc>
-                <a:extLst>
-                  <a:ext uri="{0D108BD9-81ED-4DB2-BD59-A6C34878D82A}">
-                    <a16:rowId xmlns:a16="http://schemas.microsoft.com/office/drawing/2014/main" val="10001"/>
-                  </a:ext>
-                </a:extLst>
               </a:tr>
               <a:tr h="235194">
                 <a:tc>
@@ -13066,12 +12743,12 @@
                         </a:lnSpc>
                       </a:pPr>
                       <a:r>
-                        <a:rPr lang="en-US" sz="1700">
+                        <a:rPr lang="en-US" sz="1700" b="1">
                           <a:effectLst/>
                         </a:rPr>
                         <a:t>Accuracy</a:t>
                       </a:r>
-                      <a:endParaRPr lang="en-US" sz="1700">
+                      <a:endParaRPr lang="en-US" sz="1700" b="1">
                         <a:effectLst/>
                         <a:latin typeface="Calibri" panose="020F0502020204030204" pitchFamily="34" charset="0"/>
                         <a:cs typeface="Arial" panose="020B0604020202020204" pitchFamily="34" charset="0"/>
@@ -13128,12 +12805,12 @@
                         </a:lnSpc>
                       </a:pPr>
                       <a:r>
-                        <a:rPr lang="en-US" sz="1700" b="0" dirty="0">
+                        <a:rPr lang="en-US" sz="1800" b="0" dirty="0">
                           <a:effectLst/>
                         </a:rPr>
                         <a:t>0.89</a:t>
                       </a:r>
-                      <a:endParaRPr lang="en-US" sz="1700" b="0" dirty="0">
+                      <a:endParaRPr lang="en-US" sz="1800" b="0" dirty="0">
                         <a:effectLst/>
                         <a:latin typeface="Calibri" panose="020F0502020204030204" pitchFamily="34" charset="0"/>
                         <a:cs typeface="Arial" panose="020B0604020202020204" pitchFamily="34" charset="0"/>
@@ -13193,12 +12870,12 @@
                         </a:lnSpc>
                       </a:pPr>
                       <a:r>
-                        <a:rPr lang="en-US" sz="1700" dirty="0">
+                        <a:rPr lang="en-US" sz="1800" dirty="0">
                           <a:effectLst/>
                         </a:rPr>
                         <a:t>0.84</a:t>
                       </a:r>
-                      <a:endParaRPr lang="en-US" sz="1700" dirty="0">
+                      <a:endParaRPr lang="en-US" sz="1800" dirty="0">
                         <a:effectLst/>
                         <a:latin typeface="Calibri" panose="020F0502020204030204" pitchFamily="34" charset="0"/>
                         <a:cs typeface="Arial" panose="020B0604020202020204" pitchFamily="34" charset="0"/>
@@ -13258,12 +12935,12 @@
                         </a:lnSpc>
                       </a:pPr>
                       <a:r>
-                        <a:rPr lang="en-US" sz="1700">
+                        <a:rPr lang="en-US" sz="1800">
                           <a:effectLst/>
                         </a:rPr>
                         <a:t>0.92</a:t>
                       </a:r>
-                      <a:endParaRPr lang="en-US" sz="1700">
+                      <a:endParaRPr lang="en-US" sz="1800">
                         <a:effectLst/>
                         <a:latin typeface="Calibri" panose="020F0502020204030204" pitchFamily="34" charset="0"/>
                         <a:cs typeface="Arial" panose="020B0604020202020204" pitchFamily="34" charset="0"/>
@@ -13323,12 +13000,12 @@
                         </a:lnSpc>
                       </a:pPr>
                       <a:r>
-                        <a:rPr lang="en-US" sz="1700">
+                        <a:rPr lang="en-US" sz="1800">
                           <a:effectLst/>
                         </a:rPr>
                         <a:t>0.80</a:t>
                       </a:r>
-                      <a:endParaRPr lang="en-US" sz="1700">
+                      <a:endParaRPr lang="en-US" sz="1800">
                         <a:effectLst/>
                         <a:latin typeface="Calibri" panose="020F0502020204030204" pitchFamily="34" charset="0"/>
                         <a:cs typeface="Arial" panose="020B0604020202020204" pitchFamily="34" charset="0"/>
@@ -13377,11 +13054,6 @@
                     </a:solidFill>
                   </a:tcPr>
                 </a:tc>
-                <a:extLst>
-                  <a:ext uri="{0D108BD9-81ED-4DB2-BD59-A6C34878D82A}">
-                    <a16:rowId xmlns:a16="http://schemas.microsoft.com/office/drawing/2014/main" val="10002"/>
-                  </a:ext>
-                </a:extLst>
               </a:tr>
               <a:tr h="446077">
                 <a:tc>
@@ -13395,12 +13067,12 @@
                         </a:lnSpc>
                       </a:pPr>
                       <a:r>
-                        <a:rPr lang="en-US" sz="1700" dirty="0">
+                        <a:rPr lang="en-US" sz="1700" b="1" dirty="0">
                           <a:effectLst/>
                         </a:rPr>
                         <a:t>Specificity</a:t>
                       </a:r>
-                      <a:endParaRPr lang="en-US" sz="1700" dirty="0">
+                      <a:endParaRPr lang="en-US" sz="1700" b="1" dirty="0">
                         <a:effectLst/>
                         <a:latin typeface="Calibri" panose="020F0502020204030204" pitchFamily="34" charset="0"/>
                         <a:cs typeface="Arial" panose="020B0604020202020204" pitchFamily="34" charset="0"/>
@@ -13457,12 +13129,12 @@
                         </a:lnSpc>
                       </a:pPr>
                       <a:r>
-                        <a:rPr lang="en-US" sz="1700" b="0" dirty="0">
+                        <a:rPr lang="en-US" sz="1800" b="0" dirty="0">
                           <a:effectLst/>
                         </a:rPr>
                         <a:t>0.95</a:t>
                       </a:r>
-                      <a:endParaRPr lang="en-US" sz="1700" b="0" dirty="0">
+                      <a:endParaRPr lang="en-US" sz="1800" b="0" dirty="0">
                         <a:effectLst/>
                         <a:latin typeface="Calibri" panose="020F0502020204030204" pitchFamily="34" charset="0"/>
                         <a:cs typeface="Arial" panose="020B0604020202020204" pitchFamily="34" charset="0"/>
@@ -13522,12 +13194,12 @@
                         </a:lnSpc>
                       </a:pPr>
                       <a:r>
-                        <a:rPr lang="en-US" sz="1700">
+                        <a:rPr lang="en-US" sz="1800">
                           <a:effectLst/>
                         </a:rPr>
                         <a:t>0.92</a:t>
                       </a:r>
-                      <a:endParaRPr lang="en-US" sz="1700">
+                      <a:endParaRPr lang="en-US" sz="1800">
                         <a:effectLst/>
                         <a:latin typeface="Calibri" panose="020F0502020204030204" pitchFamily="34" charset="0"/>
                         <a:cs typeface="Arial" panose="020B0604020202020204" pitchFamily="34" charset="0"/>
@@ -13587,12 +13259,12 @@
                         </a:lnSpc>
                       </a:pPr>
                       <a:r>
-                        <a:rPr lang="en-US" sz="1700" dirty="0">
+                        <a:rPr lang="en-US" sz="1800" dirty="0">
                           <a:effectLst/>
                         </a:rPr>
                         <a:t>0.99</a:t>
                       </a:r>
-                      <a:endParaRPr lang="en-US" sz="1700" dirty="0">
+                      <a:endParaRPr lang="en-US" sz="1800" dirty="0">
                         <a:effectLst/>
                         <a:latin typeface="Calibri" panose="020F0502020204030204" pitchFamily="34" charset="0"/>
                         <a:cs typeface="Arial" panose="020B0604020202020204" pitchFamily="34" charset="0"/>
@@ -13652,12 +13324,12 @@
                         </a:lnSpc>
                       </a:pPr>
                       <a:r>
-                        <a:rPr lang="en-US" sz="1700">
+                        <a:rPr lang="en-US" sz="1800">
                           <a:effectLst/>
                         </a:rPr>
                         <a:t>0.90</a:t>
                       </a:r>
-                      <a:endParaRPr lang="en-US" sz="1700">
+                      <a:endParaRPr lang="en-US" sz="1800">
                         <a:effectLst/>
                         <a:latin typeface="Calibri" panose="020F0502020204030204" pitchFamily="34" charset="0"/>
                         <a:cs typeface="Arial" panose="020B0604020202020204" pitchFamily="34" charset="0"/>
@@ -13706,11 +13378,6 @@
                     </a:solidFill>
                   </a:tcPr>
                 </a:tc>
-                <a:extLst>
-                  <a:ext uri="{0D108BD9-81ED-4DB2-BD59-A6C34878D82A}">
-                    <a16:rowId xmlns:a16="http://schemas.microsoft.com/office/drawing/2014/main" val="10003"/>
-                  </a:ext>
-                </a:extLst>
               </a:tr>
               <a:tr h="235194">
                 <a:tc>
@@ -13724,12 +13391,12 @@
                         </a:lnSpc>
                       </a:pPr>
                       <a:r>
-                        <a:rPr lang="en-US" sz="1700" dirty="0">
+                        <a:rPr lang="en-US" sz="1700" b="1" dirty="0">
                           <a:effectLst/>
                         </a:rPr>
                         <a:t>Sensitivity</a:t>
                       </a:r>
-                      <a:endParaRPr lang="en-US" sz="1700" dirty="0">
+                      <a:endParaRPr lang="en-US" sz="1700" b="1" dirty="0">
                         <a:effectLst/>
                         <a:latin typeface="Calibri" panose="020F0502020204030204" pitchFamily="34" charset="0"/>
                         <a:cs typeface="Arial" panose="020B0604020202020204" pitchFamily="34" charset="0"/>
@@ -13786,12 +13453,12 @@
                         </a:lnSpc>
                       </a:pPr>
                       <a:r>
-                        <a:rPr lang="en-US" sz="1700" b="0" dirty="0">
+                        <a:rPr lang="en-US" sz="1800" b="0" dirty="0">
                           <a:effectLst/>
                         </a:rPr>
                         <a:t>0.95</a:t>
                       </a:r>
-                      <a:endParaRPr lang="en-US" sz="1700" b="0" dirty="0">
+                      <a:endParaRPr lang="en-US" sz="1800" b="0" dirty="0">
                         <a:effectLst/>
                         <a:latin typeface="Calibri" panose="020F0502020204030204" pitchFamily="34" charset="0"/>
                         <a:cs typeface="Arial" panose="020B0604020202020204" pitchFamily="34" charset="0"/>
@@ -13851,12 +13518,12 @@
                         </a:lnSpc>
                       </a:pPr>
                       <a:r>
-                        <a:rPr lang="en-US" sz="1700">
+                        <a:rPr lang="en-US" sz="1800">
                           <a:effectLst/>
                         </a:rPr>
                         <a:t>0.97</a:t>
                       </a:r>
-                      <a:endParaRPr lang="en-US" sz="1700">
+                      <a:endParaRPr lang="en-US" sz="1800">
                         <a:effectLst/>
                         <a:latin typeface="Calibri" panose="020F0502020204030204" pitchFamily="34" charset="0"/>
                         <a:cs typeface="Arial" panose="020B0604020202020204" pitchFamily="34" charset="0"/>
@@ -13916,12 +13583,12 @@
                         </a:lnSpc>
                       </a:pPr>
                       <a:r>
-                        <a:rPr lang="en-US" sz="1700" dirty="0">
+                        <a:rPr lang="en-US" sz="1800" dirty="0">
                           <a:effectLst/>
                         </a:rPr>
                         <a:t>0.99</a:t>
                       </a:r>
-                      <a:endParaRPr lang="en-US" sz="1700" dirty="0">
+                      <a:endParaRPr lang="en-US" sz="1800" dirty="0">
                         <a:effectLst/>
                         <a:latin typeface="Calibri" panose="020F0502020204030204" pitchFamily="34" charset="0"/>
                         <a:cs typeface="Arial" panose="020B0604020202020204" pitchFamily="34" charset="0"/>
@@ -13981,12 +13648,12 @@
                         </a:lnSpc>
                       </a:pPr>
                       <a:r>
-                        <a:rPr lang="en-US" sz="1700">
+                        <a:rPr lang="en-US" sz="1800">
                           <a:effectLst/>
                         </a:rPr>
                         <a:t>0.89</a:t>
                       </a:r>
-                      <a:endParaRPr lang="en-US" sz="1700">
+                      <a:endParaRPr lang="en-US" sz="1800">
                         <a:effectLst/>
                         <a:latin typeface="Calibri" panose="020F0502020204030204" pitchFamily="34" charset="0"/>
                         <a:cs typeface="Arial" panose="020B0604020202020204" pitchFamily="34" charset="0"/>
@@ -14035,11 +13702,6 @@
                     </a:solidFill>
                   </a:tcPr>
                 </a:tc>
-                <a:extLst>
-                  <a:ext uri="{0D108BD9-81ED-4DB2-BD59-A6C34878D82A}">
-                    <a16:rowId xmlns:a16="http://schemas.microsoft.com/office/drawing/2014/main" val="10004"/>
-                  </a:ext>
-                </a:extLst>
               </a:tr>
               <a:tr h="235194">
                 <a:tc>
@@ -14053,12 +13715,12 @@
                         </a:lnSpc>
                       </a:pPr>
                       <a:r>
-                        <a:rPr lang="en-US" sz="1700" dirty="0">
+                        <a:rPr lang="en-US" sz="1700" b="1" dirty="0">
                           <a:effectLst/>
                         </a:rPr>
                         <a:t>Precision</a:t>
                       </a:r>
-                      <a:endParaRPr lang="en-US" sz="1700" dirty="0">
+                      <a:endParaRPr lang="en-US" sz="1700" b="1" dirty="0">
                         <a:effectLst/>
                         <a:latin typeface="Calibri" panose="020F0502020204030204" pitchFamily="34" charset="0"/>
                         <a:cs typeface="Arial" panose="020B0604020202020204" pitchFamily="34" charset="0"/>
@@ -14115,12 +13777,12 @@
                         </a:lnSpc>
                       </a:pPr>
                       <a:r>
-                        <a:rPr lang="en-US" sz="1700" b="0" dirty="0">
+                        <a:rPr lang="en-US" sz="1800" b="0" dirty="0">
                           <a:effectLst/>
                         </a:rPr>
                         <a:t>0.73</a:t>
                       </a:r>
-                      <a:endParaRPr lang="en-US" sz="1700" b="0" dirty="0">
+                      <a:endParaRPr lang="en-US" sz="1800" b="0" dirty="0">
                         <a:effectLst/>
                         <a:latin typeface="Calibri" panose="020F0502020204030204" pitchFamily="34" charset="0"/>
                         <a:cs typeface="Arial" panose="020B0604020202020204" pitchFamily="34" charset="0"/>
@@ -14180,12 +13842,12 @@
                         </a:lnSpc>
                       </a:pPr>
                       <a:r>
-                        <a:rPr lang="en-US" sz="1700">
+                        <a:rPr lang="en-US" sz="1800">
                           <a:effectLst/>
                         </a:rPr>
                         <a:t>0.67</a:t>
                       </a:r>
-                      <a:endParaRPr lang="en-US" sz="1700">
+                      <a:endParaRPr lang="en-US" sz="1800">
                         <a:effectLst/>
                         <a:latin typeface="Calibri" panose="020F0502020204030204" pitchFamily="34" charset="0"/>
                         <a:cs typeface="Arial" panose="020B0604020202020204" pitchFamily="34" charset="0"/>
@@ -14245,12 +13907,12 @@
                         </a:lnSpc>
                       </a:pPr>
                       <a:r>
-                        <a:rPr lang="en-US" sz="1700">
+                        <a:rPr lang="en-US" sz="1800">
                           <a:effectLst/>
                         </a:rPr>
                         <a:t>0.85</a:t>
                       </a:r>
-                      <a:endParaRPr lang="en-US" sz="1700">
+                      <a:endParaRPr lang="en-US" sz="1800">
                         <a:effectLst/>
                         <a:latin typeface="Calibri" panose="020F0502020204030204" pitchFamily="34" charset="0"/>
                         <a:cs typeface="Arial" panose="020B0604020202020204" pitchFamily="34" charset="0"/>
@@ -14310,12 +13972,12 @@
                         </a:lnSpc>
                       </a:pPr>
                       <a:r>
-                        <a:rPr lang="en-US" sz="1700" dirty="0">
+                        <a:rPr lang="en-US" sz="1800" dirty="0">
                           <a:effectLst/>
                         </a:rPr>
                         <a:t>0.85</a:t>
                       </a:r>
-                      <a:endParaRPr lang="en-US" sz="1700" dirty="0">
+                      <a:endParaRPr lang="en-US" sz="1800" dirty="0">
                         <a:effectLst/>
                         <a:latin typeface="Calibri" panose="020F0502020204030204" pitchFamily="34" charset="0"/>
                         <a:cs typeface="Arial" panose="020B0604020202020204" pitchFamily="34" charset="0"/>
@@ -14364,11 +14026,6 @@
                     </a:solidFill>
                   </a:tcPr>
                 </a:tc>
-                <a:extLst>
-                  <a:ext uri="{0D108BD9-81ED-4DB2-BD59-A6C34878D82A}">
-                    <a16:rowId xmlns:a16="http://schemas.microsoft.com/office/drawing/2014/main" val="10005"/>
-                  </a:ext>
-                </a:extLst>
               </a:tr>
               <a:tr h="235194">
                 <a:tc>
@@ -14382,12 +14039,12 @@
                         </a:lnSpc>
                       </a:pPr>
                       <a:r>
-                        <a:rPr lang="en-US" sz="1700">
+                        <a:rPr lang="en-US" sz="1700" b="1">
                           <a:effectLst/>
                         </a:rPr>
                         <a:t>PRC</a:t>
                       </a:r>
-                      <a:endParaRPr lang="en-US" sz="1700">
+                      <a:endParaRPr lang="en-US" sz="1700" b="1">
                         <a:effectLst/>
                         <a:latin typeface="Calibri" panose="020F0502020204030204" pitchFamily="34" charset="0"/>
                         <a:cs typeface="Arial" panose="020B0604020202020204" pitchFamily="34" charset="0"/>
@@ -14444,12 +14101,12 @@
                         </a:lnSpc>
                       </a:pPr>
                       <a:r>
-                        <a:rPr lang="en-US" sz="1700" b="0" dirty="0">
+                        <a:rPr lang="en-US" sz="1800" b="0" dirty="0">
                           <a:effectLst/>
                         </a:rPr>
                         <a:t>0.68</a:t>
                       </a:r>
-                      <a:endParaRPr lang="en-US" sz="1700" b="0" dirty="0">
+                      <a:endParaRPr lang="en-US" sz="1800" b="0" dirty="0">
                         <a:effectLst/>
                         <a:latin typeface="Calibri" panose="020F0502020204030204" pitchFamily="34" charset="0"/>
                         <a:cs typeface="Arial" panose="020B0604020202020204" pitchFamily="34" charset="0"/>
@@ -14509,12 +14166,12 @@
                         </a:lnSpc>
                       </a:pPr>
                       <a:r>
-                        <a:rPr lang="en-US" sz="1700">
+                        <a:rPr lang="en-US" sz="1800">
                           <a:effectLst/>
                         </a:rPr>
                         <a:t>0.63</a:t>
                       </a:r>
-                      <a:endParaRPr lang="en-US" sz="1700">
+                      <a:endParaRPr lang="en-US" sz="1800">
                         <a:effectLst/>
                         <a:latin typeface="Calibri" panose="020F0502020204030204" pitchFamily="34" charset="0"/>
                         <a:cs typeface="Arial" panose="020B0604020202020204" pitchFamily="34" charset="0"/>
@@ -14574,12 +14231,12 @@
                         </a:lnSpc>
                       </a:pPr>
                       <a:r>
-                        <a:rPr lang="en-US" sz="1700">
+                        <a:rPr lang="en-US" sz="1800">
                           <a:effectLst/>
                         </a:rPr>
                         <a:t>0.87</a:t>
                       </a:r>
-                      <a:endParaRPr lang="en-US" sz="1700">
+                      <a:endParaRPr lang="en-US" sz="1800">
                         <a:effectLst/>
                         <a:latin typeface="Calibri" panose="020F0502020204030204" pitchFamily="34" charset="0"/>
                         <a:cs typeface="Arial" panose="020B0604020202020204" pitchFamily="34" charset="0"/>
@@ -14639,12 +14296,12 @@
                         </a:lnSpc>
                       </a:pPr>
                       <a:r>
-                        <a:rPr lang="en-US" sz="1700" dirty="0">
+                        <a:rPr lang="en-US" sz="1800" dirty="0">
                           <a:effectLst/>
                         </a:rPr>
                         <a:t>0.61</a:t>
                       </a:r>
-                      <a:endParaRPr lang="en-US" sz="1700" dirty="0">
+                      <a:endParaRPr lang="en-US" sz="1800" dirty="0">
                         <a:effectLst/>
                         <a:latin typeface="Calibri" panose="020F0502020204030204" pitchFamily="34" charset="0"/>
                         <a:cs typeface="Arial" panose="020B0604020202020204" pitchFamily="34" charset="0"/>
@@ -14693,11 +14350,6 @@
                     </a:solidFill>
                   </a:tcPr>
                 </a:tc>
-                <a:extLst>
-                  <a:ext uri="{0D108BD9-81ED-4DB2-BD59-A6C34878D82A}">
-                    <a16:rowId xmlns:a16="http://schemas.microsoft.com/office/drawing/2014/main" val="10006"/>
-                  </a:ext>
-                </a:extLst>
               </a:tr>
               <a:tr h="235194">
                 <a:tc>
@@ -14711,12 +14363,12 @@
                         </a:lnSpc>
                       </a:pPr>
                       <a:r>
-                        <a:rPr lang="en-US" sz="1700" dirty="0">
+                        <a:rPr lang="en-US" sz="1700" b="1" dirty="0">
                           <a:effectLst/>
                         </a:rPr>
                         <a:t>AUC</a:t>
                       </a:r>
-                      <a:endParaRPr lang="en-US" sz="1700" dirty="0">
+                      <a:endParaRPr lang="en-US" sz="1700" b="1" dirty="0">
                         <a:effectLst/>
                         <a:latin typeface="Calibri" panose="020F0502020204030204" pitchFamily="34" charset="0"/>
                         <a:cs typeface="Arial" panose="020B0604020202020204" pitchFamily="34" charset="0"/>
@@ -14773,12 +14425,12 @@
                         </a:lnSpc>
                       </a:pPr>
                       <a:r>
-                        <a:rPr lang="en-US" sz="1700" b="0" dirty="0">
+                        <a:rPr lang="en-US" sz="1800" b="0" dirty="0">
                           <a:effectLst/>
                         </a:rPr>
                         <a:t>0.89</a:t>
                       </a:r>
-                      <a:endParaRPr lang="en-US" sz="1700" b="0" dirty="0">
+                      <a:endParaRPr lang="en-US" sz="1800" b="0" dirty="0">
                         <a:effectLst/>
                         <a:latin typeface="Calibri" panose="020F0502020204030204" pitchFamily="34" charset="0"/>
                         <a:cs typeface="Arial" panose="020B0604020202020204" pitchFamily="34" charset="0"/>
@@ -14838,12 +14490,12 @@
                         </a:lnSpc>
                       </a:pPr>
                       <a:r>
-                        <a:rPr lang="en-US" sz="1700">
+                        <a:rPr lang="en-US" sz="1800">
                           <a:effectLst/>
                         </a:rPr>
                         <a:t>0.84</a:t>
                       </a:r>
-                      <a:endParaRPr lang="en-US" sz="1700">
+                      <a:endParaRPr lang="en-US" sz="1800">
                         <a:effectLst/>
                         <a:latin typeface="Calibri" panose="020F0502020204030204" pitchFamily="34" charset="0"/>
                         <a:cs typeface="Arial" panose="020B0604020202020204" pitchFamily="34" charset="0"/>
@@ -14903,12 +14555,12 @@
                         </a:lnSpc>
                       </a:pPr>
                       <a:r>
-                        <a:rPr lang="en-US" sz="1700">
+                        <a:rPr lang="en-US" sz="1800">
                           <a:effectLst/>
                         </a:rPr>
                         <a:t>0.95</a:t>
                       </a:r>
-                      <a:endParaRPr lang="en-US" sz="1700">
+                      <a:endParaRPr lang="en-US" sz="1800">
                         <a:effectLst/>
                         <a:latin typeface="Calibri" panose="020F0502020204030204" pitchFamily="34" charset="0"/>
                         <a:cs typeface="Arial" panose="020B0604020202020204" pitchFamily="34" charset="0"/>
@@ -14968,12 +14620,12 @@
                         </a:lnSpc>
                       </a:pPr>
                       <a:r>
-                        <a:rPr lang="en-US" sz="1700" dirty="0">
+                        <a:rPr lang="en-US" sz="1800" dirty="0">
                           <a:effectLst/>
                         </a:rPr>
                         <a:t>0.82</a:t>
                       </a:r>
-                      <a:endParaRPr lang="en-US" sz="1700" dirty="0">
+                      <a:endParaRPr lang="en-US" sz="1800" dirty="0">
                         <a:effectLst/>
                         <a:latin typeface="Calibri" panose="020F0502020204030204" pitchFamily="34" charset="0"/>
                         <a:cs typeface="Arial" panose="020B0604020202020204" pitchFamily="34" charset="0"/>
@@ -15022,11 +14674,6 @@
                     </a:solidFill>
                   </a:tcPr>
                 </a:tc>
-                <a:extLst>
-                  <a:ext uri="{0D108BD9-81ED-4DB2-BD59-A6C34878D82A}">
-                    <a16:rowId xmlns:a16="http://schemas.microsoft.com/office/drawing/2014/main" val="10007"/>
-                  </a:ext>
-                </a:extLst>
               </a:tr>
             </a:tbl>
           </a:graphicData>
@@ -15040,7 +14687,7 @@
         </p:nvSpPr>
         <p:spPr>
           <a:xfrm>
-            <a:off x="838200" y="5175752"/>
+            <a:off x="838200" y="5547862"/>
             <a:ext cx="10851776" cy="832795"/>
           </a:xfrm>
           <a:prstGeom prst="rect">
@@ -15252,6 +14899,7 @@
               <a:rPr lang="en-ID" dirty="0"/>
               <a:t> (Fatima et. Al, 2022)</a:t>
             </a:r>
+            <a:endParaRPr lang="en-ID" dirty="0"/>
           </a:p>
         </p:txBody>
       </p:sp>
@@ -15260,13 +14908,13 @@
   <p:clrMapOvr>
     <a:masterClrMapping/>
   </p:clrMapOvr>
-  <mc:AlternateContent xmlns:mc="http://schemas.openxmlformats.org/markup-compatibility/2006" xmlns:p14="http://schemas.microsoft.com/office/powerpoint/2010/main">
-    <mc:Choice Requires="p14">
+  <mc:AlternateContent xmlns:mc="http://schemas.openxmlformats.org/markup-compatibility/2006">
+    <mc:Choice xmlns:p14="http://schemas.microsoft.com/office/powerpoint/2010/main" Requires="p14">
       <p:transition spd="med" p14:dur="700">
         <p:fade/>
       </p:transition>
     </mc:Choice>
-    <mc:Fallback xmlns="">
+    <mc:Fallback>
       <p:transition spd="med">
         <p:fade/>
       </p:transition>
@@ -15470,6 +15118,7 @@
               <a:rPr lang="en-ID" dirty="0"/>
               <a:t>Kesimpulan</a:t>
             </a:r>
+            <a:endParaRPr lang="en-ID" dirty="0"/>
           </a:p>
         </p:txBody>
       </p:sp>
@@ -15498,7 +15147,7 @@
             </a:pPr>
             <a:r>
               <a:rPr lang="en-US" dirty="0" err="1"/>
-              <a:t>Penelitian</a:t>
+              <a:t>	Penelitian</a:t>
             </a:r>
             <a:r>
               <a:rPr lang="en-US" dirty="0"/>
@@ -15586,7 +15235,7 @@
             </a:r>
             <a:r>
               <a:rPr lang="en-US" dirty="0" err="1"/>
-              <a:t>gambar</a:t>
+              <a:t>gambar. Data yang kami gunakan sebanyak 35.129 data</a:t>
             </a:r>
             <a:r>
               <a:rPr lang="en-US" dirty="0"/>
@@ -15900,6 +15549,7 @@
               <a:rPr lang="en-US" dirty="0"/>
               <a:t>.</a:t>
             </a:r>
+            <a:endParaRPr lang="en-US" dirty="0"/>
           </a:p>
         </p:txBody>
       </p:sp>
@@ -15908,13 +15558,13 @@
   <p:clrMapOvr>
     <a:masterClrMapping/>
   </p:clrMapOvr>
-  <mc:AlternateContent xmlns:mc="http://schemas.openxmlformats.org/markup-compatibility/2006" xmlns:p14="http://schemas.microsoft.com/office/powerpoint/2010/main">
-    <mc:Choice Requires="p14">
+  <mc:AlternateContent xmlns:mc="http://schemas.openxmlformats.org/markup-compatibility/2006">
+    <mc:Choice xmlns:p14="http://schemas.microsoft.com/office/powerpoint/2010/main" Requires="p14">
       <p:transition spd="med" p14:dur="700">
         <p:fade/>
       </p:transition>
     </mc:Choice>
-    <mc:Fallback xmlns="">
+    <mc:Fallback>
       <p:transition spd="med">
         <p:fade/>
       </p:transition>
@@ -16066,13 +15716,13 @@
   <p:clrMapOvr>
     <a:masterClrMapping/>
   </p:clrMapOvr>
-  <mc:AlternateContent xmlns:mc="http://schemas.openxmlformats.org/markup-compatibility/2006" xmlns:p14="http://schemas.microsoft.com/office/powerpoint/2010/main">
-    <mc:Choice Requires="p14">
+  <mc:AlternateContent xmlns:mc="http://schemas.openxmlformats.org/markup-compatibility/2006">
+    <mc:Choice xmlns:p14="http://schemas.microsoft.com/office/powerpoint/2010/main" Requires="p14">
       <p:transition spd="med" p14:dur="700">
         <p:fade/>
       </p:transition>
     </mc:Choice>
-    <mc:Fallback xmlns="">
+    <mc:Fallback>
       <p:transition spd="med">
         <p:fade/>
       </p:transition>
@@ -16145,6 +15795,7 @@
               <a:rPr lang="en-US" i="1" dirty="0"/>
               <a:t> :</a:t>
             </a:r>
+            <a:endParaRPr lang="en-US" i="1" dirty="0"/>
           </a:p>
           <a:p>
             <a:pPr algn="l"/>
@@ -16162,6 +15813,7 @@
               <a:rPr lang="en-US" sz="2800" dirty="0"/>
               <a:t> </a:t>
             </a:r>
+            <a:endParaRPr lang="en-US" sz="2800" dirty="0"/>
           </a:p>
           <a:p>
             <a:pPr algn="l"/>
@@ -16173,6 +15825,7 @@
               <a:rPr lang="en-US" i="1" dirty="0"/>
               <a:t> :</a:t>
             </a:r>
+            <a:endParaRPr lang="en-US" i="1" dirty="0"/>
           </a:p>
           <a:p>
             <a:pPr algn="l"/>
@@ -16190,6 +15843,7 @@
               <a:rPr lang="en-US" sz="2800" dirty="0"/>
               <a:t> </a:t>
             </a:r>
+            <a:endParaRPr lang="en-US" sz="2800" dirty="0"/>
           </a:p>
           <a:p>
             <a:pPr algn="l"/>
@@ -16201,6 +15855,7 @@
               <a:rPr lang="en-US" i="1" dirty="0"/>
               <a:t> :</a:t>
             </a:r>
+            <a:endParaRPr lang="en-US" i="1" dirty="0"/>
           </a:p>
           <a:p>
             <a:pPr algn="l"/>
@@ -16254,6 +15909,7 @@
               <a:rPr lang="en-US" b="1" i="1" dirty="0"/>
               <a:t>: </a:t>
             </a:r>
+            <a:endParaRPr lang="en-US" b="1" i="1" dirty="0"/>
           </a:p>
           <a:p>
             <a:pPr algn="l"/>
@@ -16270,13 +15926,13 @@
   <p:clrMapOvr>
     <a:masterClrMapping/>
   </p:clrMapOvr>
-  <mc:AlternateContent xmlns:mc="http://schemas.openxmlformats.org/markup-compatibility/2006" xmlns:p14="http://schemas.microsoft.com/office/powerpoint/2010/main">
-    <mc:Choice Requires="p14">
+  <mc:AlternateContent xmlns:mc="http://schemas.openxmlformats.org/markup-compatibility/2006">
+    <mc:Choice xmlns:p14="http://schemas.microsoft.com/office/powerpoint/2010/main" Requires="p14">
       <p:transition spd="med" p14:dur="700">
         <p:fade/>
       </p:transition>
     </mc:Choice>
-    <mc:Fallback xmlns="">
+    <mc:Fallback>
       <p:transition spd="med">
         <p:fade/>
       </p:transition>
@@ -16328,6 +15984,7 @@
               <a:rPr lang="en-US" sz="3600" dirty="0"/>
               <a:t>LATAR BELAKANG / PROBLEM IDENTIFICATION</a:t>
             </a:r>
+            <a:endParaRPr lang="en-US" sz="3600" dirty="0"/>
           </a:p>
         </p:txBody>
       </p:sp>
@@ -16645,6 +16302,12 @@
               </a:rPr>
               <a:t>Diabetic Retinopathy</a:t>
             </a:r>
+            <a:endParaRPr lang="en-US" i="1" dirty="0">
+              <a:solidFill>
+                <a:srgbClr val="000000"/>
+              </a:solidFill>
+              <a:latin typeface="CharisSIL"/>
+            </a:endParaRPr>
           </a:p>
           <a:p>
             <a:pPr marL="342900" indent="-342900" algn="l">
@@ -16714,6 +16377,12 @@
               </a:rPr>
               <a:t>,</a:t>
             </a:r>
+            <a:endParaRPr lang="en-US" dirty="0">
+              <a:solidFill>
+                <a:srgbClr val="000000"/>
+              </a:solidFill>
+              <a:latin typeface="CharisSIL"/>
+            </a:endParaRPr>
           </a:p>
           <a:p>
             <a:pPr marL="800100" lvl="1" indent="-342900" algn="l">
@@ -16729,6 +16398,12 @@
               </a:rPr>
               <a:t>UWF, </a:t>
             </a:r>
+            <a:endParaRPr lang="en-US" sz="1800" dirty="0">
+              <a:solidFill>
+                <a:srgbClr val="000000"/>
+              </a:solidFill>
+              <a:latin typeface="CharisSIL"/>
+            </a:endParaRPr>
           </a:p>
           <a:p>
             <a:pPr marL="800100" lvl="1" indent="-342900" algn="l">
@@ -16744,6 +16419,12 @@
               </a:rPr>
               <a:t>APTOS, </a:t>
             </a:r>
+            <a:endParaRPr lang="en-US" sz="1800" dirty="0">
+              <a:solidFill>
+                <a:srgbClr val="000000"/>
+              </a:solidFill>
+              <a:latin typeface="CharisSIL"/>
+            </a:endParaRPr>
           </a:p>
           <a:p>
             <a:pPr marL="800100" lvl="1" indent="-342900" algn="l">
@@ -16993,13 +16674,13 @@
   <p:clrMapOvr>
     <a:masterClrMapping/>
   </p:clrMapOvr>
-  <mc:AlternateContent xmlns:mc="http://schemas.openxmlformats.org/markup-compatibility/2006" xmlns:p14="http://schemas.microsoft.com/office/powerpoint/2010/main">
-    <mc:Choice Requires="p14">
+  <mc:AlternateContent xmlns:mc="http://schemas.openxmlformats.org/markup-compatibility/2006">
+    <mc:Choice xmlns:p14="http://schemas.microsoft.com/office/powerpoint/2010/main" Requires="p14">
       <p:transition spd="med" p14:dur="700">
         <p:fade/>
       </p:transition>
     </mc:Choice>
-    <mc:Fallback xmlns="">
+    <mc:Fallback>
       <p:transition spd="med">
         <p:fade/>
       </p:transition>
@@ -17052,6 +16733,7 @@
               <a:rPr lang="en-US" sz="4000" dirty="0"/>
               <a:t>BATASAN</a:t>
             </a:r>
+            <a:endParaRPr lang="en-US" sz="4000" dirty="0"/>
           </a:p>
         </p:txBody>
       </p:sp>
@@ -18544,6 +18226,12 @@
               </a:rPr>
               <a:t> :</a:t>
             </a:r>
+            <a:endParaRPr lang="en-US" sz="1600" i="0" dirty="0">
+              <a:effectLst/>
+              <a:latin typeface="Times New Roman" panose="02020603050405020304" pitchFamily="18" charset="0"/>
+              <a:ea typeface="Calibri" panose="020F0502020204030204" pitchFamily="34" charset="0"/>
+              <a:cs typeface="Arial" panose="020B0604020202020204" pitchFamily="34" charset="0"/>
+            </a:endParaRPr>
           </a:p>
           <a:p>
             <a:pPr marL="742950" lvl="1" indent="-285750" algn="l">
@@ -18864,13 +18552,13 @@
   <p:clrMapOvr>
     <a:masterClrMapping/>
   </p:clrMapOvr>
-  <mc:AlternateContent xmlns:mc="http://schemas.openxmlformats.org/markup-compatibility/2006" xmlns:p14="http://schemas.microsoft.com/office/powerpoint/2010/main">
-    <mc:Choice Requires="p14">
+  <mc:AlternateContent xmlns:mc="http://schemas.openxmlformats.org/markup-compatibility/2006">
+    <mc:Choice xmlns:p14="http://schemas.microsoft.com/office/powerpoint/2010/main" Requires="p14">
       <p:transition spd="med" p14:dur="700">
         <p:fade/>
       </p:transition>
     </mc:Choice>
-    <mc:Fallback xmlns="">
+    <mc:Fallback>
       <p:transition spd="med">
         <p:fade/>
       </p:transition>
@@ -19172,6 +18860,7 @@
               <a:rPr lang="en-US" sz="4000" dirty="0"/>
               <a:t>Classes</a:t>
             </a:r>
+            <a:endParaRPr lang="en-US" sz="4000" dirty="0"/>
           </a:p>
         </p:txBody>
       </p:sp>
@@ -19184,7 +18873,7 @@
           <p:nvPr/>
         </p:nvPicPr>
         <p:blipFill rotWithShape="1">
-          <a:blip r:embed="rId2"/>
+          <a:blip r:embed="rId1"/>
           <a:srcRect b="9757"/>
           <a:stretch>
             <a:fillRect/>
@@ -19205,13 +18894,13 @@
   <p:clrMapOvr>
     <a:masterClrMapping/>
   </p:clrMapOvr>
-  <mc:AlternateContent xmlns:mc="http://schemas.openxmlformats.org/markup-compatibility/2006" xmlns:p14="http://schemas.microsoft.com/office/powerpoint/2010/main">
-    <mc:Choice Requires="p14">
+  <mc:AlternateContent xmlns:mc="http://schemas.openxmlformats.org/markup-compatibility/2006">
+    <mc:Choice xmlns:p14="http://schemas.microsoft.com/office/powerpoint/2010/main" Requires="p14">
       <p:transition spd="med" p14:dur="700">
         <p:fade/>
       </p:transition>
     </mc:Choice>
-    <mc:Fallback xmlns="">
+    <mc:Fallback>
       <p:transition spd="med">
         <p:fade/>
       </p:transition>
@@ -19263,6 +18952,7 @@
               <a:rPr lang="en-US" sz="4000" dirty="0"/>
               <a:t>DATASETS</a:t>
             </a:r>
+            <a:endParaRPr lang="en-US" sz="4000" dirty="0"/>
           </a:p>
         </p:txBody>
       </p:sp>
@@ -19296,6 +18986,7 @@
               <a:rPr lang="en-US" sz="1800" b="1" dirty="0"/>
               <a:t> Dataset</a:t>
             </a:r>
+            <a:endParaRPr lang="en-US" sz="1800" b="1" dirty="0"/>
           </a:p>
         </p:txBody>
       </p:sp>
@@ -19308,7 +18999,7 @@
         <p:spPr>
           <a:xfrm>
             <a:off x="1228164" y="2504495"/>
-            <a:ext cx="3323771" cy="2585323"/>
+            <a:ext cx="3323771" cy="2861310"/>
           </a:xfrm>
           <a:prstGeom prst="rect">
             <a:avLst/>
@@ -19387,7 +19078,17 @@
             </a:r>
             <a:r>
               <a:rPr lang="en-US" dirty="0"/>
-              <a:t>. </a:t>
+              <a:t>. Yang kami gunakan adalah </a:t>
+            </a:r>
+            <a:r>
+              <a:rPr lang="en-US" dirty="0" err="1">
+                <a:sym typeface="+mn-ea"/>
+              </a:rPr>
+              <a:t>35.129 data.</a:t>
+            </a:r>
+            <a:r>
+              <a:rPr lang="en-US" dirty="0"/>
+              <a:t>  </a:t>
             </a:r>
             <a:r>
               <a:rPr lang="en-US" dirty="0" err="1"/>
@@ -19509,7 +19210,7 @@
         </p:xfrm>
         <a:graphic>
           <a:graphicData uri="http://schemas.openxmlformats.org/drawingml/2006/chart">
-            <c:chart xmlns:c="http://schemas.openxmlformats.org/drawingml/2006/chart" xmlns:r="http://schemas.openxmlformats.org/officeDocument/2006/relationships" r:id="rId3"/>
+            <c:chart xmlns:c="http://schemas.openxmlformats.org/drawingml/2006/chart" xmlns:r="http://schemas.openxmlformats.org/officeDocument/2006/relationships" r:id="rId1"/>
           </a:graphicData>
         </a:graphic>
       </p:graphicFrame>
@@ -19518,13 +19219,13 @@
   <p:clrMapOvr>
     <a:masterClrMapping/>
   </p:clrMapOvr>
-  <mc:AlternateContent xmlns:mc="http://schemas.openxmlformats.org/markup-compatibility/2006" xmlns:p14="http://schemas.microsoft.com/office/powerpoint/2010/main">
-    <mc:Choice Requires="p14">
+  <mc:AlternateContent xmlns:mc="http://schemas.openxmlformats.org/markup-compatibility/2006">
+    <mc:Choice xmlns:p14="http://schemas.microsoft.com/office/powerpoint/2010/main" Requires="p14">
       <p:transition spd="med" p14:dur="700">
         <p:fade/>
       </p:transition>
     </mc:Choice>
-    <mc:Fallback xmlns="">
+    <mc:Fallback>
       <p:transition spd="med">
         <p:fade/>
       </p:transition>
@@ -19706,6 +19407,7 @@
               <a:rPr lang="en-US" sz="4000" dirty="0"/>
               <a:t>LOGI</a:t>
             </a:r>
+            <a:endParaRPr lang="en-US" sz="4000" dirty="0"/>
           </a:p>
         </p:txBody>
       </p:sp>
@@ -19970,6 +19672,7 @@
               <a:rPr lang="en-US" sz="2400" dirty="0"/>
               <a:t>1</a:t>
             </a:r>
+            <a:endParaRPr lang="en-US" sz="2400" dirty="0"/>
           </a:p>
         </p:txBody>
       </p:sp>
@@ -20097,6 +19800,7 @@
               <a:rPr lang="en-US" sz="2400" dirty="0"/>
               <a:t>2</a:t>
             </a:r>
+            <a:endParaRPr lang="en-US" sz="2400" dirty="0"/>
           </a:p>
         </p:txBody>
       </p:sp>
@@ -20224,6 +19928,7 @@
               <a:rPr lang="en-US" sz="2400" dirty="0"/>
               <a:t>3</a:t>
             </a:r>
+            <a:endParaRPr lang="en-US" sz="2400" dirty="0"/>
           </a:p>
         </p:txBody>
       </p:sp>
@@ -20878,13 +20583,13 @@
   <p:clrMapOvr>
     <a:masterClrMapping/>
   </p:clrMapOvr>
-  <mc:AlternateContent xmlns:mc="http://schemas.openxmlformats.org/markup-compatibility/2006" xmlns:p14="http://schemas.microsoft.com/office/powerpoint/2010/main">
-    <mc:Choice Requires="p14">
+  <mc:AlternateContent xmlns:mc="http://schemas.openxmlformats.org/markup-compatibility/2006">
+    <mc:Choice xmlns:p14="http://schemas.microsoft.com/office/powerpoint/2010/main" Requires="p14">
       <p:transition spd="med" p14:dur="700">
         <p:fade/>
       </p:transition>
     </mc:Choice>
-    <mc:Fallback xmlns="">
+    <mc:Fallback>
       <p:transition spd="med">
         <p:fade/>
       </p:transition>
@@ -21443,6 +21148,7 @@
               <a:rPr lang="en-ID" i="1" dirty="0"/>
               <a:t>Removal of Unnecessary Information</a:t>
             </a:r>
+            <a:endParaRPr lang="en-ID" i="1" dirty="0"/>
           </a:p>
           <a:p>
             <a:pPr marL="627380" lvl="1" indent="-268605"/>
@@ -21509,6 +21215,7 @@
               <a:rPr lang="en-ID" dirty="0"/>
               <a:t>.</a:t>
             </a:r>
+            <a:endParaRPr lang="en-ID" dirty="0"/>
           </a:p>
         </p:txBody>
       </p:sp>
@@ -21521,7 +21228,7 @@
           <p:nvPr/>
         </p:nvPicPr>
         <p:blipFill>
-          <a:blip r:embed="rId2"/>
+          <a:blip r:embed="rId1"/>
           <a:stretch>
             <a:fillRect/>
           </a:stretch>
@@ -21541,13 +21248,13 @@
   <p:clrMapOvr>
     <a:masterClrMapping/>
   </p:clrMapOvr>
-  <mc:AlternateContent xmlns:mc="http://schemas.openxmlformats.org/markup-compatibility/2006" xmlns:p14="http://schemas.microsoft.com/office/powerpoint/2010/main">
-    <mc:Choice Requires="p14">
+  <mc:AlternateContent xmlns:mc="http://schemas.openxmlformats.org/markup-compatibility/2006">
+    <mc:Choice xmlns:p14="http://schemas.microsoft.com/office/powerpoint/2010/main" Requires="p14">
       <p:transition spd="med" p14:dur="700">
         <p:fade/>
       </p:transition>
     </mc:Choice>
-    <mc:Fallback xmlns="">
+    <mc:Fallback>
       <p:transition spd="med">
         <p:fade/>
       </p:transition>
@@ -21977,6 +21684,7 @@
               <a:rPr lang="en-ID" i="1" dirty="0"/>
               <a:t>Entropy Enhancement</a:t>
             </a:r>
+            <a:endParaRPr lang="en-ID" i="1" dirty="0"/>
           </a:p>
           <a:p>
             <a:pPr marL="627380" lvl="1" indent="-265430" algn="just"/>
@@ -22076,6 +21784,7 @@
               <a:rPr lang="en-ID" dirty="0"/>
               <a:t>(D).</a:t>
             </a:r>
+            <a:endParaRPr lang="en-ID" dirty="0"/>
           </a:p>
           <a:p>
             <a:pPr marL="627380" lvl="1" indent="-265430" algn="just"/>
@@ -22123,6 +21832,7 @@
               <a:rPr lang="en-ID" dirty="0"/>
               <a:t>.</a:t>
             </a:r>
+            <a:endParaRPr lang="en-ID" dirty="0"/>
           </a:p>
           <a:p>
             <a:pPr marL="627380" lvl="1" indent="-265430" algn="just"/>
@@ -22258,6 +21968,7 @@
               <a:rPr lang="en-ID" dirty="0"/>
               <a:t>.</a:t>
             </a:r>
+            <a:endParaRPr lang="en-ID" dirty="0"/>
           </a:p>
         </p:txBody>
       </p:sp>
@@ -22270,7 +21981,7 @@
           <p:nvPr/>
         </p:nvPicPr>
         <p:blipFill rotWithShape="1">
-          <a:blip r:embed="rId2"/>
+          <a:blip r:embed="rId1"/>
           <a:srcRect b="6015"/>
           <a:stretch>
             <a:fillRect/>
@@ -22291,13 +22002,13 @@
   <p:clrMapOvr>
     <a:masterClrMapping/>
   </p:clrMapOvr>
-  <mc:AlternateContent xmlns:mc="http://schemas.openxmlformats.org/markup-compatibility/2006" xmlns:p14="http://schemas.microsoft.com/office/powerpoint/2010/main">
-    <mc:Choice Requires="p14">
+  <mc:AlternateContent xmlns:mc="http://schemas.openxmlformats.org/markup-compatibility/2006">
+    <mc:Choice xmlns:p14="http://schemas.microsoft.com/office/powerpoint/2010/main" Requires="p14">
       <p:transition spd="med" p14:dur="700">
         <p:fade/>
       </p:transition>
     </mc:Choice>
-    <mc:Fallback xmlns="">
+    <mc:Fallback>
       <p:transition spd="med">
         <p:fade/>
       </p:transition>
@@ -23116,8 +22827,6 @@
       </a:bgFillStyleLst>
     </a:fmtScheme>
   </a:themeElements>
-  <a:objectDefaults/>
-  <a:extraClrSchemeLst/>
   <a:extLst>
     <a:ext uri="{05A4C25C-085E-4340-85A3-A5531E510DB2}">
       <thm15:themeFamily xmlns:thm15="http://schemas.microsoft.com/office/thememl/2012/main" name="Office Theme" id="{62F939B6-93AF-4DB8-9C6B-D6C7DFDC589F}" vid="{4A3C46E8-61CC-4603-A589-7422A47A8E4A}"/>
@@ -23377,8 +23086,6 @@
       </a:bgFillStyleLst>
     </a:fmtScheme>
   </a:themeElements>
-  <a:objectDefaults/>
-  <a:extraClrSchemeLst/>
   <a:extLst>
     <a:ext uri="{05A4C25C-085E-4340-85A3-A5531E510DB2}">
       <thm15:themeFamily xmlns:thm15="http://schemas.microsoft.com/office/thememl/2012/main" name="Office Theme" id="{62F939B6-93AF-4DB8-9C6B-D6C7DFDC589F}" vid="{4A3C46E8-61CC-4603-A589-7422A47A8E4A}"/>

</xml_diff>